<commit_message>
Alteração na documentação e ajustes no site
</commit_message>
<xml_diff>
--- a/Documentação/Pizza Baue.pptx
+++ b/Documentação/Pizza Baue.pptx
@@ -8,9 +8,16 @@
     <p:sldId id="257" r:id="rId2"/>
     <p:sldId id="258" r:id="rId3"/>
     <p:sldId id="259" r:id="rId4"/>
-    <p:sldId id="260" r:id="rId5"/>
-    <p:sldId id="262" r:id="rId6"/>
-    <p:sldId id="261" r:id="rId7"/>
+    <p:sldId id="263" r:id="rId5"/>
+    <p:sldId id="264" r:id="rId6"/>
+    <p:sldId id="265" r:id="rId7"/>
+    <p:sldId id="269" r:id="rId8"/>
+    <p:sldId id="260" r:id="rId9"/>
+    <p:sldId id="266" r:id="rId10"/>
+    <p:sldId id="262" r:id="rId11"/>
+    <p:sldId id="261" r:id="rId12"/>
+    <p:sldId id="267" r:id="rId13"/>
+    <p:sldId id="268" r:id="rId14"/>
   </p:sldIdLst>
   <p:sldSz cx="12192000" cy="6858000"/>
   <p:notesSz cx="6858000" cy="9144000"/>
@@ -117,6 +124,2328 @@
 </p:presentation>
 </file>
 
+<file path=ppt/charts/chart1.xml><?xml version="1.0" encoding="utf-8"?>
+<c:chartSpace xmlns:c="http://schemas.openxmlformats.org/drawingml/2006/chart" xmlns:a="http://schemas.openxmlformats.org/drawingml/2006/main" xmlns:r="http://schemas.openxmlformats.org/officeDocument/2006/relationships" xmlns:c16r2="http://schemas.microsoft.com/office/drawing/2015/06/chart">
+  <c:date1904 val="0"/>
+  <c:lang val="pt-BR"/>
+  <c:roundedCorners val="0"/>
+  <mc:AlternateContent xmlns:mc="http://schemas.openxmlformats.org/markup-compatibility/2006">
+    <mc:Choice xmlns:c14="http://schemas.microsoft.com/office/drawing/2007/8/2/chart" Requires="c14">
+      <c14:style val="104"/>
+    </mc:Choice>
+    <mc:Fallback>
+      <c:style val="4"/>
+    </mc:Fallback>
+  </mc:AlternateContent>
+  <c:chart>
+    <c:autoTitleDeleted val="1"/>
+    <c:plotArea>
+      <c:layout/>
+      <c:pieChart>
+        <c:varyColors val="1"/>
+        <c:ser>
+          <c:idx val="0"/>
+          <c:order val="0"/>
+          <c:dPt>
+            <c:idx val="0"/>
+            <c:bubble3D val="0"/>
+            <c:spPr>
+              <a:solidFill>
+                <a:schemeClr val="accent2">
+                  <a:shade val="65000"/>
+                </a:schemeClr>
+              </a:solidFill>
+              <a:ln>
+                <a:noFill/>
+              </a:ln>
+              <a:effectLst/>
+            </c:spPr>
+            <c:extLst>
+              <c:ext xmlns:c16="http://schemas.microsoft.com/office/drawing/2014/chart" uri="{C3380CC4-5D6E-409C-BE32-E72D297353CC}">
+                <c16:uniqueId val="{00000001-AD6B-4591-9C21-2186A33E5B04}"/>
+              </c:ext>
+            </c:extLst>
+          </c:dPt>
+          <c:dPt>
+            <c:idx val="1"/>
+            <c:bubble3D val="0"/>
+            <c:spPr>
+              <a:solidFill>
+                <a:schemeClr val="accent2"/>
+              </a:solidFill>
+              <a:ln>
+                <a:noFill/>
+              </a:ln>
+              <a:effectLst/>
+            </c:spPr>
+            <c:extLst>
+              <c:ext xmlns:c16="http://schemas.microsoft.com/office/drawing/2014/chart" uri="{C3380CC4-5D6E-409C-BE32-E72D297353CC}">
+                <c16:uniqueId val="{00000003-AD6B-4591-9C21-2186A33E5B04}"/>
+              </c:ext>
+            </c:extLst>
+          </c:dPt>
+          <c:dPt>
+            <c:idx val="2"/>
+            <c:bubble3D val="0"/>
+            <c:spPr>
+              <a:solidFill>
+                <a:schemeClr val="accent2">
+                  <a:tint val="65000"/>
+                </a:schemeClr>
+              </a:solidFill>
+              <a:ln>
+                <a:noFill/>
+              </a:ln>
+              <a:effectLst/>
+            </c:spPr>
+            <c:extLst>
+              <c:ext xmlns:c16="http://schemas.microsoft.com/office/drawing/2014/chart" uri="{C3380CC4-5D6E-409C-BE32-E72D297353CC}">
+                <c16:uniqueId val="{00000005-AD6B-4591-9C21-2186A33E5B04}"/>
+              </c:ext>
+            </c:extLst>
+          </c:dPt>
+          <c:dLbls>
+            <c:spPr>
+              <a:noFill/>
+              <a:ln>
+                <a:noFill/>
+              </a:ln>
+              <a:effectLst/>
+            </c:spPr>
+            <c:txPr>
+              <a:bodyPr rot="0" spcFirstLastPara="1" vertOverflow="ellipsis" vert="horz" wrap="square" lIns="38100" tIns="19050" rIns="38100" bIns="19050" anchor="ctr" anchorCtr="1">
+                <a:spAutoFit/>
+              </a:bodyPr>
+              <a:lstStyle/>
+              <a:p>
+                <a:pPr>
+                  <a:defRPr sz="1600" b="0" i="0" u="none" strike="noStrike" kern="1200" baseline="0">
+                    <a:solidFill>
+                      <a:schemeClr val="tx1">
+                        <a:lumMod val="75000"/>
+                        <a:lumOff val="25000"/>
+                      </a:schemeClr>
+                    </a:solidFill>
+                    <a:latin typeface="+mn-lt"/>
+                    <a:ea typeface="+mn-ea"/>
+                    <a:cs typeface="+mn-cs"/>
+                  </a:defRPr>
+                </a:pPr>
+                <a:endParaRPr lang="pt-BR"/>
+              </a:p>
+            </c:txPr>
+            <c:dLblPos val="bestFit"/>
+            <c:showLegendKey val="0"/>
+            <c:showVal val="1"/>
+            <c:showCatName val="0"/>
+            <c:showSerName val="0"/>
+            <c:showPercent val="0"/>
+            <c:showBubbleSize val="0"/>
+            <c:showLeaderLines val="1"/>
+            <c:leaderLines>
+              <c:spPr>
+                <a:ln w="9525" cap="flat" cmpd="sng" algn="ctr">
+                  <a:solidFill>
+                    <a:schemeClr val="tx1">
+                      <a:lumMod val="35000"/>
+                      <a:lumOff val="65000"/>
+                    </a:schemeClr>
+                  </a:solidFill>
+                  <a:round/>
+                </a:ln>
+                <a:effectLst/>
+              </c:spPr>
+            </c:leaderLines>
+            <c:extLst>
+              <c:ext xmlns:c15="http://schemas.microsoft.com/office/drawing/2012/chart" uri="{CE6537A1-D6FC-4f65-9D91-7224C49458BB}">
+                <c15:layout/>
+              </c:ext>
+            </c:extLst>
+          </c:dLbls>
+          <c:cat>
+            <c:strRef>
+              <c:f>Planilha1!$A$2:$C$2</c:f>
+              <c:strCache>
+                <c:ptCount val="3"/>
+                <c:pt idx="0">
+                  <c:v>Sim</c:v>
+                </c:pt>
+                <c:pt idx="1">
+                  <c:v>Não</c:v>
+                </c:pt>
+                <c:pt idx="2">
+                  <c:v>Tanto faz</c:v>
+                </c:pt>
+              </c:strCache>
+            </c:strRef>
+          </c:cat>
+          <c:val>
+            <c:numRef>
+              <c:f>Planilha1!$A$3:$C$3</c:f>
+              <c:numCache>
+                <c:formatCode>General</c:formatCode>
+                <c:ptCount val="3"/>
+                <c:pt idx="0">
+                  <c:v>51</c:v>
+                </c:pt>
+                <c:pt idx="1">
+                  <c:v>0</c:v>
+                </c:pt>
+                <c:pt idx="2">
+                  <c:v>1</c:v>
+                </c:pt>
+              </c:numCache>
+            </c:numRef>
+          </c:val>
+          <c:extLst>
+            <c:ext xmlns:c16="http://schemas.microsoft.com/office/drawing/2014/chart" uri="{C3380CC4-5D6E-409C-BE32-E72D297353CC}">
+              <c16:uniqueId val="{00000006-AD6B-4591-9C21-2186A33E5B04}"/>
+            </c:ext>
+          </c:extLst>
+        </c:ser>
+        <c:dLbls>
+          <c:showLegendKey val="0"/>
+          <c:showVal val="0"/>
+          <c:showCatName val="0"/>
+          <c:showSerName val="0"/>
+          <c:showPercent val="0"/>
+          <c:showBubbleSize val="0"/>
+          <c:showLeaderLines val="1"/>
+        </c:dLbls>
+        <c:firstSliceAng val="0"/>
+      </c:pieChart>
+      <c:spPr>
+        <a:noFill/>
+        <a:ln>
+          <a:noFill/>
+        </a:ln>
+        <a:effectLst/>
+      </c:spPr>
+    </c:plotArea>
+    <c:legend>
+      <c:legendPos val="r"/>
+      <c:layout/>
+      <c:overlay val="0"/>
+      <c:spPr>
+        <a:noFill/>
+        <a:ln>
+          <a:noFill/>
+        </a:ln>
+        <a:effectLst/>
+      </c:spPr>
+      <c:txPr>
+        <a:bodyPr rot="0" spcFirstLastPara="1" vertOverflow="ellipsis" vert="horz" wrap="square" anchor="ctr" anchorCtr="1"/>
+        <a:lstStyle/>
+        <a:p>
+          <a:pPr>
+            <a:defRPr sz="1600" b="0" i="0" u="none" strike="noStrike" kern="1200" baseline="0">
+              <a:solidFill>
+                <a:schemeClr val="tx1">
+                  <a:lumMod val="65000"/>
+                  <a:lumOff val="35000"/>
+                </a:schemeClr>
+              </a:solidFill>
+              <a:latin typeface="+mn-lt"/>
+              <a:ea typeface="+mn-ea"/>
+              <a:cs typeface="+mn-cs"/>
+            </a:defRPr>
+          </a:pPr>
+          <a:endParaRPr lang="pt-BR"/>
+        </a:p>
+      </c:txPr>
+    </c:legend>
+    <c:plotVisOnly val="1"/>
+    <c:dispBlanksAs val="gap"/>
+    <c:showDLblsOverMax val="0"/>
+  </c:chart>
+  <c:spPr>
+    <a:noFill/>
+    <a:ln>
+      <a:noFill/>
+    </a:ln>
+    <a:effectLst/>
+  </c:spPr>
+  <c:txPr>
+    <a:bodyPr/>
+    <a:lstStyle/>
+    <a:p>
+      <a:pPr>
+        <a:defRPr/>
+      </a:pPr>
+      <a:endParaRPr lang="pt-BR"/>
+    </a:p>
+  </c:txPr>
+  <c:externalData r:id="rId3">
+    <c:autoUpdate val="0"/>
+  </c:externalData>
+</c:chartSpace>
+</file>
+
+<file path=ppt/charts/chart2.xml><?xml version="1.0" encoding="utf-8"?>
+<c:chartSpace xmlns:c="http://schemas.openxmlformats.org/drawingml/2006/chart" xmlns:a="http://schemas.openxmlformats.org/drawingml/2006/main" xmlns:r="http://schemas.openxmlformats.org/officeDocument/2006/relationships" xmlns:c16r2="http://schemas.microsoft.com/office/drawing/2015/06/chart">
+  <c:date1904 val="0"/>
+  <c:lang val="pt-BR"/>
+  <c:roundedCorners val="0"/>
+  <mc:AlternateContent xmlns:mc="http://schemas.openxmlformats.org/markup-compatibility/2006">
+    <mc:Choice xmlns:c14="http://schemas.microsoft.com/office/drawing/2007/8/2/chart" Requires="c14">
+      <c14:style val="104"/>
+    </mc:Choice>
+    <mc:Fallback>
+      <c:style val="4"/>
+    </mc:Fallback>
+  </mc:AlternateContent>
+  <c:chart>
+    <c:autoTitleDeleted val="1"/>
+    <c:plotArea>
+      <c:layout/>
+      <c:pieChart>
+        <c:varyColors val="1"/>
+        <c:ser>
+          <c:idx val="0"/>
+          <c:order val="0"/>
+          <c:dPt>
+            <c:idx val="0"/>
+            <c:bubble3D val="0"/>
+            <c:spPr>
+              <a:solidFill>
+                <a:schemeClr val="accent2">
+                  <a:shade val="65000"/>
+                </a:schemeClr>
+              </a:solidFill>
+              <a:ln w="19050">
+                <a:solidFill>
+                  <a:schemeClr val="lt1"/>
+                </a:solidFill>
+              </a:ln>
+              <a:effectLst/>
+            </c:spPr>
+            <c:extLst>
+              <c:ext xmlns:c16="http://schemas.microsoft.com/office/drawing/2014/chart" uri="{C3380CC4-5D6E-409C-BE32-E72D297353CC}">
+                <c16:uniqueId val="{00000001-43AB-4538-9518-A554C6F9CC91}"/>
+              </c:ext>
+            </c:extLst>
+          </c:dPt>
+          <c:dPt>
+            <c:idx val="1"/>
+            <c:bubble3D val="0"/>
+            <c:spPr>
+              <a:solidFill>
+                <a:schemeClr val="accent2"/>
+              </a:solidFill>
+              <a:ln w="19050">
+                <a:solidFill>
+                  <a:schemeClr val="lt1"/>
+                </a:solidFill>
+              </a:ln>
+              <a:effectLst/>
+            </c:spPr>
+            <c:extLst>
+              <c:ext xmlns:c16="http://schemas.microsoft.com/office/drawing/2014/chart" uri="{C3380CC4-5D6E-409C-BE32-E72D297353CC}">
+                <c16:uniqueId val="{00000003-43AB-4538-9518-A554C6F9CC91}"/>
+              </c:ext>
+            </c:extLst>
+          </c:dPt>
+          <c:dPt>
+            <c:idx val="2"/>
+            <c:bubble3D val="0"/>
+            <c:spPr>
+              <a:solidFill>
+                <a:schemeClr val="accent2">
+                  <a:tint val="65000"/>
+                </a:schemeClr>
+              </a:solidFill>
+              <a:ln w="19050">
+                <a:solidFill>
+                  <a:schemeClr val="lt1"/>
+                </a:solidFill>
+              </a:ln>
+              <a:effectLst/>
+            </c:spPr>
+            <c:extLst>
+              <c:ext xmlns:c16="http://schemas.microsoft.com/office/drawing/2014/chart" uri="{C3380CC4-5D6E-409C-BE32-E72D297353CC}">
+                <c16:uniqueId val="{00000005-43AB-4538-9518-A554C6F9CC91}"/>
+              </c:ext>
+            </c:extLst>
+          </c:dPt>
+          <c:dLbls>
+            <c:spPr>
+              <a:noFill/>
+              <a:ln>
+                <a:noFill/>
+              </a:ln>
+              <a:effectLst/>
+            </c:spPr>
+            <c:txPr>
+              <a:bodyPr rot="0" spcFirstLastPara="1" vertOverflow="ellipsis" vert="horz" wrap="square" lIns="38100" tIns="19050" rIns="38100" bIns="19050" anchor="ctr" anchorCtr="1">
+                <a:spAutoFit/>
+              </a:bodyPr>
+              <a:lstStyle/>
+              <a:p>
+                <a:pPr>
+                  <a:defRPr sz="1600" b="0" i="0" u="none" strike="noStrike" kern="1200" baseline="0">
+                    <a:solidFill>
+                      <a:schemeClr val="tx1">
+                        <a:lumMod val="75000"/>
+                        <a:lumOff val="25000"/>
+                      </a:schemeClr>
+                    </a:solidFill>
+                    <a:latin typeface="+mn-lt"/>
+                    <a:ea typeface="+mn-ea"/>
+                    <a:cs typeface="+mn-cs"/>
+                  </a:defRPr>
+                </a:pPr>
+                <a:endParaRPr lang="pt-BR"/>
+              </a:p>
+            </c:txPr>
+            <c:showLegendKey val="0"/>
+            <c:showVal val="1"/>
+            <c:showCatName val="0"/>
+            <c:showSerName val="0"/>
+            <c:showPercent val="0"/>
+            <c:showBubbleSize val="0"/>
+            <c:showLeaderLines val="1"/>
+            <c:leaderLines>
+              <c:spPr>
+                <a:ln w="9525" cap="flat" cmpd="sng" algn="ctr">
+                  <a:solidFill>
+                    <a:schemeClr val="tx1">
+                      <a:lumMod val="35000"/>
+                      <a:lumOff val="65000"/>
+                    </a:schemeClr>
+                  </a:solidFill>
+                  <a:round/>
+                </a:ln>
+                <a:effectLst/>
+              </c:spPr>
+            </c:leaderLines>
+            <c:extLst>
+              <c:ext xmlns:c15="http://schemas.microsoft.com/office/drawing/2012/chart" uri="{CE6537A1-D6FC-4f65-9D91-7224C49458BB}">
+                <c15:layout/>
+              </c:ext>
+            </c:extLst>
+          </c:dLbls>
+          <c:cat>
+            <c:strRef>
+              <c:f>Planilha2!$A$2:$C$2</c:f>
+              <c:strCache>
+                <c:ptCount val="3"/>
+                <c:pt idx="0">
+                  <c:v>Sim</c:v>
+                </c:pt>
+                <c:pt idx="1">
+                  <c:v>Não</c:v>
+                </c:pt>
+                <c:pt idx="2">
+                  <c:v>Tanto faz</c:v>
+                </c:pt>
+              </c:strCache>
+            </c:strRef>
+          </c:cat>
+          <c:val>
+            <c:numRef>
+              <c:f>Planilha2!$A$3:$C$3</c:f>
+              <c:numCache>
+                <c:formatCode>General</c:formatCode>
+                <c:ptCount val="3"/>
+                <c:pt idx="0">
+                  <c:v>44</c:v>
+                </c:pt>
+                <c:pt idx="1">
+                  <c:v>4</c:v>
+                </c:pt>
+                <c:pt idx="2">
+                  <c:v>4</c:v>
+                </c:pt>
+              </c:numCache>
+            </c:numRef>
+          </c:val>
+          <c:extLst>
+            <c:ext xmlns:c16="http://schemas.microsoft.com/office/drawing/2014/chart" uri="{C3380CC4-5D6E-409C-BE32-E72D297353CC}">
+              <c16:uniqueId val="{00000006-43AB-4538-9518-A554C6F9CC91}"/>
+            </c:ext>
+          </c:extLst>
+        </c:ser>
+        <c:dLbls>
+          <c:showLegendKey val="0"/>
+          <c:showVal val="0"/>
+          <c:showCatName val="0"/>
+          <c:showSerName val="0"/>
+          <c:showPercent val="0"/>
+          <c:showBubbleSize val="0"/>
+          <c:showLeaderLines val="1"/>
+        </c:dLbls>
+        <c:firstSliceAng val="0"/>
+      </c:pieChart>
+      <c:spPr>
+        <a:noFill/>
+        <a:ln>
+          <a:noFill/>
+        </a:ln>
+        <a:effectLst/>
+      </c:spPr>
+    </c:plotArea>
+    <c:legend>
+      <c:legendPos val="r"/>
+      <c:layout/>
+      <c:overlay val="0"/>
+      <c:spPr>
+        <a:noFill/>
+        <a:ln>
+          <a:noFill/>
+        </a:ln>
+        <a:effectLst/>
+      </c:spPr>
+      <c:txPr>
+        <a:bodyPr rot="0" spcFirstLastPara="1" vertOverflow="ellipsis" vert="horz" wrap="square" anchor="ctr" anchorCtr="1"/>
+        <a:lstStyle/>
+        <a:p>
+          <a:pPr>
+            <a:defRPr sz="1600" b="0" i="0" u="none" strike="noStrike" kern="1200" baseline="0">
+              <a:solidFill>
+                <a:schemeClr val="tx1">
+                  <a:lumMod val="65000"/>
+                  <a:lumOff val="35000"/>
+                </a:schemeClr>
+              </a:solidFill>
+              <a:latin typeface="+mn-lt"/>
+              <a:ea typeface="+mn-ea"/>
+              <a:cs typeface="+mn-cs"/>
+            </a:defRPr>
+          </a:pPr>
+          <a:endParaRPr lang="pt-BR"/>
+        </a:p>
+      </c:txPr>
+    </c:legend>
+    <c:plotVisOnly val="1"/>
+    <c:dispBlanksAs val="gap"/>
+    <c:showDLblsOverMax val="0"/>
+  </c:chart>
+  <c:spPr>
+    <a:solidFill>
+      <a:schemeClr val="bg1"/>
+    </a:solidFill>
+    <a:ln w="3175" cap="flat" cmpd="sng" algn="ctr">
+      <a:noFill/>
+      <a:round/>
+    </a:ln>
+    <a:effectLst/>
+  </c:spPr>
+  <c:txPr>
+    <a:bodyPr/>
+    <a:lstStyle/>
+    <a:p>
+      <a:pPr>
+        <a:defRPr/>
+      </a:pPr>
+      <a:endParaRPr lang="pt-BR"/>
+    </a:p>
+  </c:txPr>
+  <c:externalData r:id="rId3">
+    <c:autoUpdate val="0"/>
+  </c:externalData>
+</c:chartSpace>
+</file>
+
+<file path=ppt/charts/chart3.xml><?xml version="1.0" encoding="utf-8"?>
+<c:chartSpace xmlns:c="http://schemas.openxmlformats.org/drawingml/2006/chart" xmlns:a="http://schemas.openxmlformats.org/drawingml/2006/main" xmlns:r="http://schemas.openxmlformats.org/officeDocument/2006/relationships" xmlns:c16r2="http://schemas.microsoft.com/office/drawing/2015/06/chart">
+  <c:date1904 val="0"/>
+  <c:lang val="pt-BR"/>
+  <c:roundedCorners val="0"/>
+  <mc:AlternateContent xmlns:mc="http://schemas.openxmlformats.org/markup-compatibility/2006">
+    <mc:Choice xmlns:c14="http://schemas.microsoft.com/office/drawing/2007/8/2/chart" Requires="c14">
+      <c14:style val="104"/>
+    </mc:Choice>
+    <mc:Fallback>
+      <c:style val="4"/>
+    </mc:Fallback>
+  </mc:AlternateContent>
+  <c:chart>
+    <c:autoTitleDeleted val="1"/>
+    <c:plotArea>
+      <c:layout/>
+      <c:pieChart>
+        <c:varyColors val="1"/>
+        <c:ser>
+          <c:idx val="0"/>
+          <c:order val="0"/>
+          <c:dPt>
+            <c:idx val="0"/>
+            <c:bubble3D val="0"/>
+            <c:spPr>
+              <a:solidFill>
+                <a:schemeClr val="accent2">
+                  <a:shade val="65000"/>
+                </a:schemeClr>
+              </a:solidFill>
+              <a:ln>
+                <a:noFill/>
+              </a:ln>
+              <a:effectLst/>
+            </c:spPr>
+            <c:extLst>
+              <c:ext xmlns:c16="http://schemas.microsoft.com/office/drawing/2014/chart" uri="{C3380CC4-5D6E-409C-BE32-E72D297353CC}">
+                <c16:uniqueId val="{00000001-9899-436A-9937-6EA1275109C5}"/>
+              </c:ext>
+            </c:extLst>
+          </c:dPt>
+          <c:dPt>
+            <c:idx val="1"/>
+            <c:bubble3D val="0"/>
+            <c:spPr>
+              <a:solidFill>
+                <a:schemeClr val="accent2"/>
+              </a:solidFill>
+              <a:ln>
+                <a:noFill/>
+              </a:ln>
+              <a:effectLst/>
+            </c:spPr>
+            <c:extLst>
+              <c:ext xmlns:c16="http://schemas.microsoft.com/office/drawing/2014/chart" uri="{C3380CC4-5D6E-409C-BE32-E72D297353CC}">
+                <c16:uniqueId val="{00000003-9899-436A-9937-6EA1275109C5}"/>
+              </c:ext>
+            </c:extLst>
+          </c:dPt>
+          <c:dPt>
+            <c:idx val="2"/>
+            <c:bubble3D val="0"/>
+            <c:spPr>
+              <a:solidFill>
+                <a:schemeClr val="accent2">
+                  <a:tint val="65000"/>
+                </a:schemeClr>
+              </a:solidFill>
+              <a:ln>
+                <a:noFill/>
+              </a:ln>
+              <a:effectLst/>
+            </c:spPr>
+            <c:extLst>
+              <c:ext xmlns:c16="http://schemas.microsoft.com/office/drawing/2014/chart" uri="{C3380CC4-5D6E-409C-BE32-E72D297353CC}">
+                <c16:uniqueId val="{00000005-9899-436A-9937-6EA1275109C5}"/>
+              </c:ext>
+            </c:extLst>
+          </c:dPt>
+          <c:dLbls>
+            <c:spPr>
+              <a:noFill/>
+              <a:ln>
+                <a:noFill/>
+              </a:ln>
+              <a:effectLst/>
+            </c:spPr>
+            <c:txPr>
+              <a:bodyPr rot="0" spcFirstLastPara="1" vertOverflow="ellipsis" vert="horz" wrap="square" lIns="38100" tIns="19050" rIns="38100" bIns="19050" anchor="ctr" anchorCtr="1">
+                <a:spAutoFit/>
+              </a:bodyPr>
+              <a:lstStyle/>
+              <a:p>
+                <a:pPr>
+                  <a:defRPr sz="1600" b="0" i="0" u="none" strike="noStrike" kern="1200" baseline="0">
+                    <a:solidFill>
+                      <a:schemeClr val="tx1">
+                        <a:lumMod val="75000"/>
+                        <a:lumOff val="25000"/>
+                      </a:schemeClr>
+                    </a:solidFill>
+                    <a:latin typeface="+mn-lt"/>
+                    <a:ea typeface="+mn-ea"/>
+                    <a:cs typeface="+mn-cs"/>
+                  </a:defRPr>
+                </a:pPr>
+                <a:endParaRPr lang="pt-BR"/>
+              </a:p>
+            </c:txPr>
+            <c:dLblPos val="bestFit"/>
+            <c:showLegendKey val="0"/>
+            <c:showVal val="1"/>
+            <c:showCatName val="0"/>
+            <c:showSerName val="0"/>
+            <c:showPercent val="0"/>
+            <c:showBubbleSize val="0"/>
+            <c:showLeaderLines val="1"/>
+            <c:leaderLines>
+              <c:spPr>
+                <a:ln w="9525" cap="flat" cmpd="sng" algn="ctr">
+                  <a:solidFill>
+                    <a:schemeClr val="tx1">
+                      <a:lumMod val="35000"/>
+                      <a:lumOff val="65000"/>
+                    </a:schemeClr>
+                  </a:solidFill>
+                  <a:round/>
+                </a:ln>
+                <a:effectLst/>
+              </c:spPr>
+            </c:leaderLines>
+            <c:extLst>
+              <c:ext xmlns:c15="http://schemas.microsoft.com/office/drawing/2012/chart" uri="{CE6537A1-D6FC-4f65-9D91-7224C49458BB}">
+                <c15:layout/>
+              </c:ext>
+            </c:extLst>
+          </c:dLbls>
+          <c:cat>
+            <c:strRef>
+              <c:f>Planilha1!$A$2:$C$2</c:f>
+              <c:strCache>
+                <c:ptCount val="3"/>
+                <c:pt idx="0">
+                  <c:v>Sim</c:v>
+                </c:pt>
+                <c:pt idx="1">
+                  <c:v>Não</c:v>
+                </c:pt>
+                <c:pt idx="2">
+                  <c:v>Tanto faz</c:v>
+                </c:pt>
+              </c:strCache>
+            </c:strRef>
+          </c:cat>
+          <c:val>
+            <c:numRef>
+              <c:f>Planilha1!$A$3:$C$3</c:f>
+              <c:numCache>
+                <c:formatCode>General</c:formatCode>
+                <c:ptCount val="3"/>
+                <c:pt idx="0">
+                  <c:v>48</c:v>
+                </c:pt>
+                <c:pt idx="1">
+                  <c:v>0</c:v>
+                </c:pt>
+                <c:pt idx="2">
+                  <c:v>4</c:v>
+                </c:pt>
+              </c:numCache>
+            </c:numRef>
+          </c:val>
+          <c:extLst>
+            <c:ext xmlns:c16="http://schemas.microsoft.com/office/drawing/2014/chart" uri="{C3380CC4-5D6E-409C-BE32-E72D297353CC}">
+              <c16:uniqueId val="{00000006-9899-436A-9937-6EA1275109C5}"/>
+            </c:ext>
+          </c:extLst>
+        </c:ser>
+        <c:dLbls>
+          <c:showLegendKey val="0"/>
+          <c:showVal val="0"/>
+          <c:showCatName val="0"/>
+          <c:showSerName val="0"/>
+          <c:showPercent val="0"/>
+          <c:showBubbleSize val="0"/>
+          <c:showLeaderLines val="1"/>
+        </c:dLbls>
+        <c:firstSliceAng val="0"/>
+      </c:pieChart>
+      <c:spPr>
+        <a:noFill/>
+        <a:ln>
+          <a:noFill/>
+        </a:ln>
+        <a:effectLst/>
+      </c:spPr>
+    </c:plotArea>
+    <c:legend>
+      <c:legendPos val="r"/>
+      <c:layout/>
+      <c:overlay val="0"/>
+      <c:spPr>
+        <a:noFill/>
+        <a:ln>
+          <a:noFill/>
+        </a:ln>
+        <a:effectLst/>
+      </c:spPr>
+      <c:txPr>
+        <a:bodyPr rot="0" spcFirstLastPara="1" vertOverflow="ellipsis" vert="horz" wrap="square" anchor="ctr" anchorCtr="1"/>
+        <a:lstStyle/>
+        <a:p>
+          <a:pPr>
+            <a:defRPr sz="1600" b="0" i="0" u="none" strike="noStrike" kern="1200" baseline="0">
+              <a:solidFill>
+                <a:schemeClr val="tx1">
+                  <a:lumMod val="65000"/>
+                  <a:lumOff val="35000"/>
+                </a:schemeClr>
+              </a:solidFill>
+              <a:latin typeface="+mn-lt"/>
+              <a:ea typeface="+mn-ea"/>
+              <a:cs typeface="+mn-cs"/>
+            </a:defRPr>
+          </a:pPr>
+          <a:endParaRPr lang="pt-BR"/>
+        </a:p>
+      </c:txPr>
+    </c:legend>
+    <c:plotVisOnly val="1"/>
+    <c:dispBlanksAs val="gap"/>
+    <c:showDLblsOverMax val="0"/>
+  </c:chart>
+  <c:spPr>
+    <a:noFill/>
+    <a:ln>
+      <a:noFill/>
+    </a:ln>
+    <a:effectLst/>
+  </c:spPr>
+  <c:txPr>
+    <a:bodyPr/>
+    <a:lstStyle/>
+    <a:p>
+      <a:pPr>
+        <a:defRPr/>
+      </a:pPr>
+      <a:endParaRPr lang="pt-BR"/>
+    </a:p>
+  </c:txPr>
+  <c:externalData r:id="rId3">
+    <c:autoUpdate val="0"/>
+  </c:externalData>
+</c:chartSpace>
+</file>
+
+<file path=ppt/charts/colors1.xml><?xml version="1.0" encoding="utf-8"?>
+<cs:colorStyle xmlns:cs="http://schemas.microsoft.com/office/drawing/2012/chartStyle" xmlns:a="http://schemas.openxmlformats.org/drawingml/2006/main" meth="withinLinear" id="15">
+  <a:schemeClr val="accent2"/>
+</cs:colorStyle>
+</file>
+
+<file path=ppt/charts/colors2.xml><?xml version="1.0" encoding="utf-8"?>
+<cs:colorStyle xmlns:cs="http://schemas.microsoft.com/office/drawing/2012/chartStyle" xmlns:a="http://schemas.openxmlformats.org/drawingml/2006/main" meth="withinLinear" id="15">
+  <a:schemeClr val="accent2"/>
+</cs:colorStyle>
+</file>
+
+<file path=ppt/charts/colors3.xml><?xml version="1.0" encoding="utf-8"?>
+<cs:colorStyle xmlns:cs="http://schemas.microsoft.com/office/drawing/2012/chartStyle" xmlns:a="http://schemas.openxmlformats.org/drawingml/2006/main" meth="withinLinear" id="15">
+  <a:schemeClr val="accent2"/>
+</cs:colorStyle>
+</file>
+
+<file path=ppt/charts/style1.xml><?xml version="1.0" encoding="utf-8"?>
+<cs:chartStyle xmlns:cs="http://schemas.microsoft.com/office/drawing/2012/chartStyle" xmlns:a="http://schemas.openxmlformats.org/drawingml/2006/main" id="201">
+  <cs:axisTitle>
+    <cs:lnRef idx="0"/>
+    <cs:fillRef idx="0"/>
+    <cs:effectRef idx="0"/>
+    <cs:fontRef idx="minor">
+      <a:schemeClr val="tx1">
+        <a:lumMod val="65000"/>
+        <a:lumOff val="35000"/>
+      </a:schemeClr>
+    </cs:fontRef>
+    <cs:defRPr sz="1000" kern="1200"/>
+  </cs:axisTitle>
+  <cs:categoryAxis>
+    <cs:lnRef idx="0"/>
+    <cs:fillRef idx="0"/>
+    <cs:effectRef idx="0"/>
+    <cs:fontRef idx="minor">
+      <a:schemeClr val="tx1">
+        <a:lumMod val="65000"/>
+        <a:lumOff val="35000"/>
+      </a:schemeClr>
+    </cs:fontRef>
+    <cs:spPr>
+      <a:ln w="9525" cap="flat" cmpd="sng" algn="ctr">
+        <a:solidFill>
+          <a:schemeClr val="tx1">
+            <a:lumMod val="15000"/>
+            <a:lumOff val="85000"/>
+          </a:schemeClr>
+        </a:solidFill>
+        <a:round/>
+      </a:ln>
+    </cs:spPr>
+    <cs:defRPr sz="900" kern="1200"/>
+  </cs:categoryAxis>
+  <cs:chartArea mods="allowNoFillOverride allowNoLineOverride">
+    <cs:lnRef idx="0"/>
+    <cs:fillRef idx="0"/>
+    <cs:effectRef idx="0"/>
+    <cs:fontRef idx="minor">
+      <a:schemeClr val="tx1"/>
+    </cs:fontRef>
+    <cs:spPr>
+      <a:solidFill>
+        <a:schemeClr val="bg1"/>
+      </a:solidFill>
+      <a:ln w="9525" cap="flat" cmpd="sng" algn="ctr">
+        <a:solidFill>
+          <a:schemeClr val="tx1">
+            <a:lumMod val="15000"/>
+            <a:lumOff val="85000"/>
+          </a:schemeClr>
+        </a:solidFill>
+        <a:round/>
+      </a:ln>
+    </cs:spPr>
+    <cs:defRPr sz="1000" kern="1200"/>
+  </cs:chartArea>
+  <cs:dataLabel>
+    <cs:lnRef idx="0"/>
+    <cs:fillRef idx="0"/>
+    <cs:effectRef idx="0"/>
+    <cs:fontRef idx="minor">
+      <a:schemeClr val="tx1">
+        <a:lumMod val="75000"/>
+        <a:lumOff val="25000"/>
+      </a:schemeClr>
+    </cs:fontRef>
+    <cs:defRPr sz="900" kern="1200"/>
+  </cs:dataLabel>
+  <cs:dataLabelCallout>
+    <cs:lnRef idx="0"/>
+    <cs:fillRef idx="0"/>
+    <cs:effectRef idx="0"/>
+    <cs:fontRef idx="minor">
+      <a:schemeClr val="dk1">
+        <a:lumMod val="65000"/>
+        <a:lumOff val="35000"/>
+      </a:schemeClr>
+    </cs:fontRef>
+    <cs:spPr>
+      <a:solidFill>
+        <a:schemeClr val="lt1"/>
+      </a:solidFill>
+      <a:ln>
+        <a:solidFill>
+          <a:schemeClr val="dk1">
+            <a:lumMod val="25000"/>
+            <a:lumOff val="75000"/>
+          </a:schemeClr>
+        </a:solidFill>
+      </a:ln>
+    </cs:spPr>
+    <cs:defRPr sz="900" kern="1200"/>
+    <cs:bodyPr rot="0" spcFirstLastPara="1" vertOverflow="clip" horzOverflow="clip" vert="horz" wrap="square" lIns="36576" tIns="18288" rIns="36576" bIns="18288" anchor="ctr" anchorCtr="1">
+      <a:spAutoFit/>
+    </cs:bodyPr>
+  </cs:dataLabelCallout>
+  <cs:dataPoint>
+    <cs:lnRef idx="0"/>
+    <cs:fillRef idx="1">
+      <cs:styleClr val="auto"/>
+    </cs:fillRef>
+    <cs:effectRef idx="0"/>
+    <cs:fontRef idx="minor">
+      <a:schemeClr val="tx1"/>
+    </cs:fontRef>
+  </cs:dataPoint>
+  <cs:dataPoint3D>
+    <cs:lnRef idx="0"/>
+    <cs:fillRef idx="1">
+      <cs:styleClr val="auto"/>
+    </cs:fillRef>
+    <cs:effectRef idx="0"/>
+    <cs:fontRef idx="minor">
+      <a:schemeClr val="tx1"/>
+    </cs:fontRef>
+  </cs:dataPoint3D>
+  <cs:dataPointLine>
+    <cs:lnRef idx="0">
+      <cs:styleClr val="auto"/>
+    </cs:lnRef>
+    <cs:fillRef idx="1"/>
+    <cs:effectRef idx="0"/>
+    <cs:fontRef idx="minor">
+      <a:schemeClr val="tx1"/>
+    </cs:fontRef>
+    <cs:spPr>
+      <a:ln w="28575" cap="rnd">
+        <a:solidFill>
+          <a:schemeClr val="phClr"/>
+        </a:solidFill>
+        <a:round/>
+      </a:ln>
+    </cs:spPr>
+  </cs:dataPointLine>
+  <cs:dataPointMarker>
+    <cs:lnRef idx="0">
+      <cs:styleClr val="auto"/>
+    </cs:lnRef>
+    <cs:fillRef idx="1">
+      <cs:styleClr val="auto"/>
+    </cs:fillRef>
+    <cs:effectRef idx="0"/>
+    <cs:fontRef idx="minor">
+      <a:schemeClr val="tx1"/>
+    </cs:fontRef>
+    <cs:spPr>
+      <a:ln w="9525">
+        <a:solidFill>
+          <a:schemeClr val="phClr"/>
+        </a:solidFill>
+      </a:ln>
+    </cs:spPr>
+  </cs:dataPointMarker>
+  <cs:dataPointMarkerLayout symbol="circle" size="5"/>
+  <cs:dataPointWireframe>
+    <cs:lnRef idx="0">
+      <cs:styleClr val="auto"/>
+    </cs:lnRef>
+    <cs:fillRef idx="1"/>
+    <cs:effectRef idx="0"/>
+    <cs:fontRef idx="minor">
+      <a:schemeClr val="tx1"/>
+    </cs:fontRef>
+    <cs:spPr>
+      <a:ln w="9525" cap="rnd">
+        <a:solidFill>
+          <a:schemeClr val="phClr"/>
+        </a:solidFill>
+        <a:round/>
+      </a:ln>
+    </cs:spPr>
+  </cs:dataPointWireframe>
+  <cs:dataTable>
+    <cs:lnRef idx="0"/>
+    <cs:fillRef idx="0"/>
+    <cs:effectRef idx="0"/>
+    <cs:fontRef idx="minor">
+      <a:schemeClr val="tx1">
+        <a:lumMod val="65000"/>
+        <a:lumOff val="35000"/>
+      </a:schemeClr>
+    </cs:fontRef>
+    <cs:spPr>
+      <a:noFill/>
+      <a:ln w="9525" cap="flat" cmpd="sng" algn="ctr">
+        <a:solidFill>
+          <a:schemeClr val="tx1">
+            <a:lumMod val="15000"/>
+            <a:lumOff val="85000"/>
+          </a:schemeClr>
+        </a:solidFill>
+        <a:round/>
+      </a:ln>
+    </cs:spPr>
+    <cs:defRPr sz="900" kern="1200"/>
+  </cs:dataTable>
+  <cs:downBar>
+    <cs:lnRef idx="0"/>
+    <cs:fillRef idx="0"/>
+    <cs:effectRef idx="0"/>
+    <cs:fontRef idx="minor">
+      <a:schemeClr val="dk1"/>
+    </cs:fontRef>
+    <cs:spPr>
+      <a:solidFill>
+        <a:schemeClr val="dk1">
+          <a:lumMod val="65000"/>
+          <a:lumOff val="35000"/>
+        </a:schemeClr>
+      </a:solidFill>
+      <a:ln w="9525">
+        <a:solidFill>
+          <a:schemeClr val="tx1">
+            <a:lumMod val="65000"/>
+            <a:lumOff val="35000"/>
+          </a:schemeClr>
+        </a:solidFill>
+      </a:ln>
+    </cs:spPr>
+  </cs:downBar>
+  <cs:dropLine>
+    <cs:lnRef idx="0"/>
+    <cs:fillRef idx="0"/>
+    <cs:effectRef idx="0"/>
+    <cs:fontRef idx="minor">
+      <a:schemeClr val="tx1"/>
+    </cs:fontRef>
+    <cs:spPr>
+      <a:ln w="9525" cap="flat" cmpd="sng" algn="ctr">
+        <a:solidFill>
+          <a:schemeClr val="tx1">
+            <a:lumMod val="35000"/>
+            <a:lumOff val="65000"/>
+          </a:schemeClr>
+        </a:solidFill>
+        <a:round/>
+      </a:ln>
+    </cs:spPr>
+  </cs:dropLine>
+  <cs:errorBar>
+    <cs:lnRef idx="0"/>
+    <cs:fillRef idx="0"/>
+    <cs:effectRef idx="0"/>
+    <cs:fontRef idx="minor">
+      <a:schemeClr val="tx1"/>
+    </cs:fontRef>
+    <cs:spPr>
+      <a:ln w="9525" cap="flat" cmpd="sng" algn="ctr">
+        <a:solidFill>
+          <a:schemeClr val="tx1">
+            <a:lumMod val="65000"/>
+            <a:lumOff val="35000"/>
+          </a:schemeClr>
+        </a:solidFill>
+        <a:round/>
+      </a:ln>
+    </cs:spPr>
+  </cs:errorBar>
+  <cs:floor>
+    <cs:lnRef idx="0"/>
+    <cs:fillRef idx="0"/>
+    <cs:effectRef idx="0"/>
+    <cs:fontRef idx="minor">
+      <a:schemeClr val="tx1"/>
+    </cs:fontRef>
+    <cs:spPr>
+      <a:noFill/>
+      <a:ln>
+        <a:noFill/>
+      </a:ln>
+    </cs:spPr>
+  </cs:floor>
+  <cs:gridlineMajor>
+    <cs:lnRef idx="0"/>
+    <cs:fillRef idx="0"/>
+    <cs:effectRef idx="0"/>
+    <cs:fontRef idx="minor">
+      <a:schemeClr val="tx1"/>
+    </cs:fontRef>
+    <cs:spPr>
+      <a:ln w="9525" cap="flat" cmpd="sng" algn="ctr">
+        <a:solidFill>
+          <a:schemeClr val="tx1">
+            <a:lumMod val="15000"/>
+            <a:lumOff val="85000"/>
+          </a:schemeClr>
+        </a:solidFill>
+        <a:round/>
+      </a:ln>
+    </cs:spPr>
+  </cs:gridlineMajor>
+  <cs:gridlineMinor>
+    <cs:lnRef idx="0"/>
+    <cs:fillRef idx="0"/>
+    <cs:effectRef idx="0"/>
+    <cs:fontRef idx="minor">
+      <a:schemeClr val="tx1"/>
+    </cs:fontRef>
+    <cs:spPr>
+      <a:ln w="9525" cap="flat" cmpd="sng" algn="ctr">
+        <a:solidFill>
+          <a:schemeClr val="tx1">
+            <a:lumMod val="5000"/>
+            <a:lumOff val="95000"/>
+          </a:schemeClr>
+        </a:solidFill>
+        <a:round/>
+      </a:ln>
+    </cs:spPr>
+  </cs:gridlineMinor>
+  <cs:hiLoLine>
+    <cs:lnRef idx="0"/>
+    <cs:fillRef idx="0"/>
+    <cs:effectRef idx="0"/>
+    <cs:fontRef idx="minor">
+      <a:schemeClr val="tx1"/>
+    </cs:fontRef>
+    <cs:spPr>
+      <a:ln w="9525" cap="flat" cmpd="sng" algn="ctr">
+        <a:solidFill>
+          <a:schemeClr val="tx1">
+            <a:lumMod val="75000"/>
+            <a:lumOff val="25000"/>
+          </a:schemeClr>
+        </a:solidFill>
+        <a:round/>
+      </a:ln>
+    </cs:spPr>
+  </cs:hiLoLine>
+  <cs:leaderLine>
+    <cs:lnRef idx="0"/>
+    <cs:fillRef idx="0"/>
+    <cs:effectRef idx="0"/>
+    <cs:fontRef idx="minor">
+      <a:schemeClr val="tx1"/>
+    </cs:fontRef>
+    <cs:spPr>
+      <a:ln w="9525" cap="flat" cmpd="sng" algn="ctr">
+        <a:solidFill>
+          <a:schemeClr val="tx1">
+            <a:lumMod val="35000"/>
+            <a:lumOff val="65000"/>
+          </a:schemeClr>
+        </a:solidFill>
+        <a:round/>
+      </a:ln>
+    </cs:spPr>
+  </cs:leaderLine>
+  <cs:legend>
+    <cs:lnRef idx="0"/>
+    <cs:fillRef idx="0"/>
+    <cs:effectRef idx="0"/>
+    <cs:fontRef idx="minor">
+      <a:schemeClr val="tx1">
+        <a:lumMod val="65000"/>
+        <a:lumOff val="35000"/>
+      </a:schemeClr>
+    </cs:fontRef>
+    <cs:defRPr sz="900" kern="1200"/>
+  </cs:legend>
+  <cs:plotArea mods="allowNoFillOverride allowNoLineOverride">
+    <cs:lnRef idx="0"/>
+    <cs:fillRef idx="0"/>
+    <cs:effectRef idx="0"/>
+    <cs:fontRef idx="minor">
+      <a:schemeClr val="tx1"/>
+    </cs:fontRef>
+  </cs:plotArea>
+  <cs:plotArea3D mods="allowNoFillOverride allowNoLineOverride">
+    <cs:lnRef idx="0"/>
+    <cs:fillRef idx="0"/>
+    <cs:effectRef idx="0"/>
+    <cs:fontRef idx="minor">
+      <a:schemeClr val="tx1"/>
+    </cs:fontRef>
+  </cs:plotArea3D>
+  <cs:seriesAxis>
+    <cs:lnRef idx="0"/>
+    <cs:fillRef idx="0"/>
+    <cs:effectRef idx="0"/>
+    <cs:fontRef idx="minor">
+      <a:schemeClr val="tx1">
+        <a:lumMod val="65000"/>
+        <a:lumOff val="35000"/>
+      </a:schemeClr>
+    </cs:fontRef>
+    <cs:defRPr sz="900" kern="1200"/>
+  </cs:seriesAxis>
+  <cs:seriesLine>
+    <cs:lnRef idx="0"/>
+    <cs:fillRef idx="0"/>
+    <cs:effectRef idx="0"/>
+    <cs:fontRef idx="minor">
+      <a:schemeClr val="tx1"/>
+    </cs:fontRef>
+    <cs:spPr>
+      <a:ln w="9525" cap="flat" cmpd="sng" algn="ctr">
+        <a:solidFill>
+          <a:schemeClr val="tx1">
+            <a:lumMod val="35000"/>
+            <a:lumOff val="65000"/>
+          </a:schemeClr>
+        </a:solidFill>
+        <a:round/>
+      </a:ln>
+    </cs:spPr>
+  </cs:seriesLine>
+  <cs:title>
+    <cs:lnRef idx="0"/>
+    <cs:fillRef idx="0"/>
+    <cs:effectRef idx="0"/>
+    <cs:fontRef idx="minor">
+      <a:schemeClr val="tx1">
+        <a:lumMod val="65000"/>
+        <a:lumOff val="35000"/>
+      </a:schemeClr>
+    </cs:fontRef>
+    <cs:defRPr sz="1400" b="0" kern="1200" spc="0" baseline="0"/>
+  </cs:title>
+  <cs:trendline>
+    <cs:lnRef idx="0">
+      <cs:styleClr val="auto"/>
+    </cs:lnRef>
+    <cs:fillRef idx="0"/>
+    <cs:effectRef idx="0"/>
+    <cs:fontRef idx="minor">
+      <a:schemeClr val="tx1"/>
+    </cs:fontRef>
+    <cs:spPr>
+      <a:ln w="19050" cap="rnd">
+        <a:solidFill>
+          <a:schemeClr val="phClr"/>
+        </a:solidFill>
+        <a:prstDash val="sysDot"/>
+      </a:ln>
+    </cs:spPr>
+  </cs:trendline>
+  <cs:trendlineLabel>
+    <cs:lnRef idx="0"/>
+    <cs:fillRef idx="0"/>
+    <cs:effectRef idx="0"/>
+    <cs:fontRef idx="minor">
+      <a:schemeClr val="tx1">
+        <a:lumMod val="65000"/>
+        <a:lumOff val="35000"/>
+      </a:schemeClr>
+    </cs:fontRef>
+    <cs:defRPr sz="900" kern="1200"/>
+  </cs:trendlineLabel>
+  <cs:upBar>
+    <cs:lnRef idx="0"/>
+    <cs:fillRef idx="0"/>
+    <cs:effectRef idx="0"/>
+    <cs:fontRef idx="minor">
+      <a:schemeClr val="dk1"/>
+    </cs:fontRef>
+    <cs:spPr>
+      <a:solidFill>
+        <a:schemeClr val="lt1"/>
+      </a:solidFill>
+      <a:ln w="9525">
+        <a:solidFill>
+          <a:schemeClr val="tx1">
+            <a:lumMod val="15000"/>
+            <a:lumOff val="85000"/>
+          </a:schemeClr>
+        </a:solidFill>
+      </a:ln>
+    </cs:spPr>
+  </cs:upBar>
+  <cs:valueAxis>
+    <cs:lnRef idx="0"/>
+    <cs:fillRef idx="0"/>
+    <cs:effectRef idx="0"/>
+    <cs:fontRef idx="minor">
+      <a:schemeClr val="tx1">
+        <a:lumMod val="65000"/>
+        <a:lumOff val="35000"/>
+      </a:schemeClr>
+    </cs:fontRef>
+    <cs:defRPr sz="900" kern="1200"/>
+  </cs:valueAxis>
+  <cs:wall>
+    <cs:lnRef idx="0"/>
+    <cs:fillRef idx="0"/>
+    <cs:effectRef idx="0"/>
+    <cs:fontRef idx="minor">
+      <a:schemeClr val="tx1"/>
+    </cs:fontRef>
+    <cs:spPr>
+      <a:noFill/>
+      <a:ln>
+        <a:noFill/>
+      </a:ln>
+    </cs:spPr>
+  </cs:wall>
+</cs:chartStyle>
+</file>
+
+<file path=ppt/charts/style2.xml><?xml version="1.0" encoding="utf-8"?>
+<cs:chartStyle xmlns:cs="http://schemas.microsoft.com/office/drawing/2012/chartStyle" xmlns:a="http://schemas.openxmlformats.org/drawingml/2006/main" id="251">
+  <cs:axisTitle>
+    <cs:lnRef idx="0"/>
+    <cs:fillRef idx="0"/>
+    <cs:effectRef idx="0"/>
+    <cs:fontRef idx="minor">
+      <a:schemeClr val="tx1">
+        <a:lumMod val="65000"/>
+        <a:lumOff val="35000"/>
+      </a:schemeClr>
+    </cs:fontRef>
+    <cs:defRPr sz="1000" kern="1200"/>
+  </cs:axisTitle>
+  <cs:categoryAxis>
+    <cs:lnRef idx="0"/>
+    <cs:fillRef idx="0"/>
+    <cs:effectRef idx="0"/>
+    <cs:fontRef idx="minor">
+      <a:schemeClr val="tx1">
+        <a:lumMod val="65000"/>
+        <a:lumOff val="35000"/>
+      </a:schemeClr>
+    </cs:fontRef>
+    <cs:spPr>
+      <a:ln w="9525" cap="flat" cmpd="sng" algn="ctr">
+        <a:solidFill>
+          <a:schemeClr val="tx1">
+            <a:lumMod val="15000"/>
+            <a:lumOff val="85000"/>
+          </a:schemeClr>
+        </a:solidFill>
+        <a:round/>
+      </a:ln>
+    </cs:spPr>
+    <cs:defRPr sz="900" kern="1200"/>
+  </cs:categoryAxis>
+  <cs:chartArea mods="allowNoFillOverride allowNoLineOverride">
+    <cs:lnRef idx="0"/>
+    <cs:fillRef idx="0"/>
+    <cs:effectRef idx="0"/>
+    <cs:fontRef idx="minor">
+      <a:schemeClr val="tx1"/>
+    </cs:fontRef>
+    <cs:spPr>
+      <a:solidFill>
+        <a:schemeClr val="bg1"/>
+      </a:solidFill>
+      <a:ln w="9525" cap="flat" cmpd="sng" algn="ctr">
+        <a:solidFill>
+          <a:schemeClr val="tx1">
+            <a:lumMod val="15000"/>
+            <a:lumOff val="85000"/>
+          </a:schemeClr>
+        </a:solidFill>
+        <a:round/>
+      </a:ln>
+    </cs:spPr>
+    <cs:defRPr sz="900" kern="1200"/>
+  </cs:chartArea>
+  <cs:dataLabel>
+    <cs:lnRef idx="0"/>
+    <cs:fillRef idx="0"/>
+    <cs:effectRef idx="0"/>
+    <cs:fontRef idx="minor">
+      <a:schemeClr val="tx1">
+        <a:lumMod val="75000"/>
+        <a:lumOff val="25000"/>
+      </a:schemeClr>
+    </cs:fontRef>
+    <cs:defRPr sz="900" kern="1200"/>
+  </cs:dataLabel>
+  <cs:dataLabelCallout>
+    <cs:lnRef idx="0"/>
+    <cs:fillRef idx="0"/>
+    <cs:effectRef idx="0"/>
+    <cs:fontRef idx="minor">
+      <a:schemeClr val="dk1">
+        <a:lumMod val="65000"/>
+        <a:lumOff val="35000"/>
+      </a:schemeClr>
+    </cs:fontRef>
+    <cs:spPr>
+      <a:solidFill>
+        <a:schemeClr val="lt1"/>
+      </a:solidFill>
+      <a:ln>
+        <a:solidFill>
+          <a:schemeClr val="dk1">
+            <a:lumMod val="25000"/>
+            <a:lumOff val="75000"/>
+          </a:schemeClr>
+        </a:solidFill>
+      </a:ln>
+    </cs:spPr>
+    <cs:defRPr sz="900" kern="1200"/>
+    <cs:bodyPr rot="0" spcFirstLastPara="1" vertOverflow="clip" horzOverflow="clip" vert="horz" wrap="square" lIns="36576" tIns="18288" rIns="36576" bIns="18288" anchor="ctr" anchorCtr="1">
+      <a:spAutoFit/>
+    </cs:bodyPr>
+  </cs:dataLabelCallout>
+  <cs:dataPoint>
+    <cs:lnRef idx="0"/>
+    <cs:fillRef idx="1">
+      <cs:styleClr val="auto"/>
+    </cs:fillRef>
+    <cs:effectRef idx="0"/>
+    <cs:fontRef idx="minor">
+      <a:schemeClr val="tx1"/>
+    </cs:fontRef>
+    <cs:spPr>
+      <a:ln w="19050">
+        <a:solidFill>
+          <a:schemeClr val="lt1"/>
+        </a:solidFill>
+      </a:ln>
+    </cs:spPr>
+  </cs:dataPoint>
+  <cs:dataPoint3D>
+    <cs:lnRef idx="0"/>
+    <cs:fillRef idx="1">
+      <cs:styleClr val="auto"/>
+    </cs:fillRef>
+    <cs:effectRef idx="0"/>
+    <cs:fontRef idx="minor">
+      <a:schemeClr val="tx1"/>
+    </cs:fontRef>
+    <cs:spPr>
+      <a:ln w="25400">
+        <a:solidFill>
+          <a:schemeClr val="lt1"/>
+        </a:solidFill>
+      </a:ln>
+    </cs:spPr>
+  </cs:dataPoint3D>
+  <cs:dataPointLine>
+    <cs:lnRef idx="0">
+      <cs:styleClr val="auto"/>
+    </cs:lnRef>
+    <cs:fillRef idx="0"/>
+    <cs:effectRef idx="0"/>
+    <cs:fontRef idx="minor">
+      <a:schemeClr val="tx1"/>
+    </cs:fontRef>
+    <cs:spPr>
+      <a:ln w="28575" cap="rnd">
+        <a:solidFill>
+          <a:schemeClr val="phClr"/>
+        </a:solidFill>
+        <a:round/>
+      </a:ln>
+    </cs:spPr>
+  </cs:dataPointLine>
+  <cs:dataPointMarker>
+    <cs:lnRef idx="0">
+      <cs:styleClr val="auto"/>
+    </cs:lnRef>
+    <cs:fillRef idx="1">
+      <cs:styleClr val="auto"/>
+    </cs:fillRef>
+    <cs:effectRef idx="0"/>
+    <cs:fontRef idx="minor">
+      <a:schemeClr val="tx1"/>
+    </cs:fontRef>
+    <cs:spPr>
+      <a:ln w="9525">
+        <a:solidFill>
+          <a:schemeClr val="phClr"/>
+        </a:solidFill>
+      </a:ln>
+    </cs:spPr>
+  </cs:dataPointMarker>
+  <cs:dataPointMarkerLayout symbol="circle" size="5"/>
+  <cs:dataPointWireframe>
+    <cs:lnRef idx="0">
+      <cs:styleClr val="auto"/>
+    </cs:lnRef>
+    <cs:fillRef idx="0"/>
+    <cs:effectRef idx="0"/>
+    <cs:fontRef idx="minor">
+      <a:schemeClr val="tx1"/>
+    </cs:fontRef>
+    <cs:spPr>
+      <a:ln w="9525" cap="rnd">
+        <a:solidFill>
+          <a:schemeClr val="phClr"/>
+        </a:solidFill>
+        <a:round/>
+      </a:ln>
+    </cs:spPr>
+  </cs:dataPointWireframe>
+  <cs:dataTable>
+    <cs:lnRef idx="0"/>
+    <cs:fillRef idx="0"/>
+    <cs:effectRef idx="0"/>
+    <cs:fontRef idx="minor">
+      <a:schemeClr val="tx1">
+        <a:lumMod val="65000"/>
+        <a:lumOff val="35000"/>
+      </a:schemeClr>
+    </cs:fontRef>
+    <cs:spPr>
+      <a:noFill/>
+      <a:ln w="9525" cap="flat" cmpd="sng" algn="ctr">
+        <a:solidFill>
+          <a:schemeClr val="tx1">
+            <a:lumMod val="15000"/>
+            <a:lumOff val="85000"/>
+          </a:schemeClr>
+        </a:solidFill>
+        <a:round/>
+      </a:ln>
+    </cs:spPr>
+    <cs:defRPr sz="900" kern="1200"/>
+  </cs:dataTable>
+  <cs:downBar>
+    <cs:lnRef idx="0"/>
+    <cs:fillRef idx="0"/>
+    <cs:effectRef idx="0"/>
+    <cs:fontRef idx="minor">
+      <a:schemeClr val="tx1"/>
+    </cs:fontRef>
+    <cs:spPr>
+      <a:solidFill>
+        <a:schemeClr val="dk1">
+          <a:lumMod val="75000"/>
+          <a:lumOff val="25000"/>
+        </a:schemeClr>
+      </a:solidFill>
+      <a:ln w="9525" cap="flat" cmpd="sng" algn="ctr">
+        <a:solidFill>
+          <a:schemeClr val="tx1">
+            <a:lumMod val="65000"/>
+            <a:lumOff val="35000"/>
+          </a:schemeClr>
+        </a:solidFill>
+        <a:round/>
+      </a:ln>
+    </cs:spPr>
+  </cs:downBar>
+  <cs:dropLine>
+    <cs:lnRef idx="0"/>
+    <cs:fillRef idx="0"/>
+    <cs:effectRef idx="0"/>
+    <cs:fontRef idx="minor">
+      <a:schemeClr val="tx1"/>
+    </cs:fontRef>
+    <cs:spPr>
+      <a:ln w="9525" cap="flat" cmpd="sng" algn="ctr">
+        <a:solidFill>
+          <a:schemeClr val="tx1">
+            <a:lumMod val="35000"/>
+            <a:lumOff val="65000"/>
+          </a:schemeClr>
+        </a:solidFill>
+        <a:round/>
+      </a:ln>
+    </cs:spPr>
+  </cs:dropLine>
+  <cs:errorBar>
+    <cs:lnRef idx="0"/>
+    <cs:fillRef idx="0"/>
+    <cs:effectRef idx="0"/>
+    <cs:fontRef idx="minor">
+      <a:schemeClr val="tx1"/>
+    </cs:fontRef>
+    <cs:spPr>
+      <a:ln w="9525" cap="flat" cmpd="sng" algn="ctr">
+        <a:solidFill>
+          <a:schemeClr val="tx1">
+            <a:lumMod val="65000"/>
+            <a:lumOff val="35000"/>
+          </a:schemeClr>
+        </a:solidFill>
+        <a:round/>
+      </a:ln>
+    </cs:spPr>
+  </cs:errorBar>
+  <cs:floor>
+    <cs:lnRef idx="0"/>
+    <cs:fillRef idx="0"/>
+    <cs:effectRef idx="0"/>
+    <cs:fontRef idx="minor">
+      <a:schemeClr val="tx1"/>
+    </cs:fontRef>
+    <cs:spPr>
+      <a:noFill/>
+      <a:ln>
+        <a:noFill/>
+      </a:ln>
+    </cs:spPr>
+  </cs:floor>
+  <cs:gridlineMajor>
+    <cs:lnRef idx="0"/>
+    <cs:fillRef idx="0"/>
+    <cs:effectRef idx="0"/>
+    <cs:fontRef idx="minor">
+      <a:schemeClr val="tx1"/>
+    </cs:fontRef>
+    <cs:spPr>
+      <a:ln w="9525" cap="flat" cmpd="sng" algn="ctr">
+        <a:solidFill>
+          <a:schemeClr val="tx1">
+            <a:lumMod val="15000"/>
+            <a:lumOff val="85000"/>
+          </a:schemeClr>
+        </a:solidFill>
+        <a:round/>
+      </a:ln>
+    </cs:spPr>
+  </cs:gridlineMajor>
+  <cs:gridlineMinor>
+    <cs:lnRef idx="0"/>
+    <cs:fillRef idx="0"/>
+    <cs:effectRef idx="0"/>
+    <cs:fontRef idx="minor">
+      <a:schemeClr val="tx1"/>
+    </cs:fontRef>
+    <cs:spPr>
+      <a:ln w="9525" cap="flat" cmpd="sng" algn="ctr">
+        <a:solidFill>
+          <a:schemeClr val="tx1">
+            <a:lumMod val="5000"/>
+            <a:lumOff val="95000"/>
+          </a:schemeClr>
+        </a:solidFill>
+        <a:round/>
+      </a:ln>
+    </cs:spPr>
+  </cs:gridlineMinor>
+  <cs:hiLoLine>
+    <cs:lnRef idx="0"/>
+    <cs:fillRef idx="0"/>
+    <cs:effectRef idx="0"/>
+    <cs:fontRef idx="minor">
+      <a:schemeClr val="tx1"/>
+    </cs:fontRef>
+    <cs:spPr>
+      <a:ln w="9525" cap="flat" cmpd="sng" algn="ctr">
+        <a:solidFill>
+          <a:schemeClr val="tx1">
+            <a:lumMod val="50000"/>
+            <a:lumOff val="50000"/>
+          </a:schemeClr>
+        </a:solidFill>
+        <a:round/>
+      </a:ln>
+    </cs:spPr>
+  </cs:hiLoLine>
+  <cs:leaderLine>
+    <cs:lnRef idx="0"/>
+    <cs:fillRef idx="0"/>
+    <cs:effectRef idx="0"/>
+    <cs:fontRef idx="minor">
+      <a:schemeClr val="tx1"/>
+    </cs:fontRef>
+    <cs:spPr>
+      <a:ln w="9525" cap="flat" cmpd="sng" algn="ctr">
+        <a:solidFill>
+          <a:schemeClr val="tx1">
+            <a:lumMod val="35000"/>
+            <a:lumOff val="65000"/>
+          </a:schemeClr>
+        </a:solidFill>
+        <a:round/>
+      </a:ln>
+    </cs:spPr>
+  </cs:leaderLine>
+  <cs:legend>
+    <cs:lnRef idx="0"/>
+    <cs:fillRef idx="0"/>
+    <cs:effectRef idx="0"/>
+    <cs:fontRef idx="minor">
+      <a:schemeClr val="tx1">
+        <a:lumMod val="65000"/>
+        <a:lumOff val="35000"/>
+      </a:schemeClr>
+    </cs:fontRef>
+    <cs:defRPr sz="900" kern="1200"/>
+  </cs:legend>
+  <cs:plotArea mods="allowNoFillOverride allowNoLineOverride">
+    <cs:lnRef idx="0"/>
+    <cs:fillRef idx="0"/>
+    <cs:effectRef idx="0"/>
+    <cs:fontRef idx="minor">
+      <a:schemeClr val="tx1"/>
+    </cs:fontRef>
+  </cs:plotArea>
+  <cs:plotArea3D mods="allowNoFillOverride allowNoLineOverride">
+    <cs:lnRef idx="0"/>
+    <cs:fillRef idx="0"/>
+    <cs:effectRef idx="0"/>
+    <cs:fontRef idx="minor">
+      <a:schemeClr val="tx1"/>
+    </cs:fontRef>
+  </cs:plotArea3D>
+  <cs:seriesAxis>
+    <cs:lnRef idx="0"/>
+    <cs:fillRef idx="0"/>
+    <cs:effectRef idx="0"/>
+    <cs:fontRef idx="minor">
+      <a:schemeClr val="tx1">
+        <a:lumMod val="65000"/>
+        <a:lumOff val="35000"/>
+      </a:schemeClr>
+    </cs:fontRef>
+    <cs:defRPr sz="900" kern="1200"/>
+  </cs:seriesAxis>
+  <cs:seriesLine>
+    <cs:lnRef idx="0"/>
+    <cs:fillRef idx="0"/>
+    <cs:effectRef idx="0"/>
+    <cs:fontRef idx="minor">
+      <a:schemeClr val="tx1"/>
+    </cs:fontRef>
+    <cs:spPr>
+      <a:ln w="9525" cap="flat" cmpd="sng" algn="ctr">
+        <a:solidFill>
+          <a:schemeClr val="tx1">
+            <a:lumMod val="35000"/>
+            <a:lumOff val="65000"/>
+          </a:schemeClr>
+        </a:solidFill>
+        <a:round/>
+      </a:ln>
+    </cs:spPr>
+  </cs:seriesLine>
+  <cs:title>
+    <cs:lnRef idx="0"/>
+    <cs:fillRef idx="0"/>
+    <cs:effectRef idx="0"/>
+    <cs:fontRef idx="minor">
+      <a:schemeClr val="tx1">
+        <a:lumMod val="65000"/>
+        <a:lumOff val="35000"/>
+      </a:schemeClr>
+    </cs:fontRef>
+    <cs:defRPr sz="1400" b="0" kern="1200" spc="0" baseline="0"/>
+  </cs:title>
+  <cs:trendline>
+    <cs:lnRef idx="0">
+      <cs:styleClr val="auto"/>
+    </cs:lnRef>
+    <cs:fillRef idx="0"/>
+    <cs:effectRef idx="0"/>
+    <cs:fontRef idx="minor">
+      <a:schemeClr val="tx1"/>
+    </cs:fontRef>
+    <cs:spPr>
+      <a:ln w="19050" cap="rnd">
+        <a:solidFill>
+          <a:schemeClr val="phClr"/>
+        </a:solidFill>
+        <a:prstDash val="sysDot"/>
+      </a:ln>
+    </cs:spPr>
+  </cs:trendline>
+  <cs:trendlineLabel>
+    <cs:lnRef idx="0"/>
+    <cs:fillRef idx="0"/>
+    <cs:effectRef idx="0"/>
+    <cs:fontRef idx="minor">
+      <a:schemeClr val="tx1">
+        <a:lumMod val="65000"/>
+        <a:lumOff val="35000"/>
+      </a:schemeClr>
+    </cs:fontRef>
+    <cs:defRPr sz="900" kern="1200"/>
+  </cs:trendlineLabel>
+  <cs:upBar>
+    <cs:lnRef idx="0"/>
+    <cs:fillRef idx="0"/>
+    <cs:effectRef idx="0"/>
+    <cs:fontRef idx="minor">
+      <a:schemeClr val="tx1"/>
+    </cs:fontRef>
+    <cs:spPr>
+      <a:solidFill>
+        <a:schemeClr val="lt1"/>
+      </a:solidFill>
+      <a:ln w="9525" cap="flat" cmpd="sng" algn="ctr">
+        <a:solidFill>
+          <a:schemeClr val="tx1">
+            <a:lumMod val="65000"/>
+            <a:lumOff val="35000"/>
+          </a:schemeClr>
+        </a:solidFill>
+        <a:round/>
+      </a:ln>
+    </cs:spPr>
+  </cs:upBar>
+  <cs:valueAxis>
+    <cs:lnRef idx="0"/>
+    <cs:fillRef idx="0"/>
+    <cs:effectRef idx="0"/>
+    <cs:fontRef idx="minor">
+      <a:schemeClr val="tx1">
+        <a:lumMod val="65000"/>
+        <a:lumOff val="35000"/>
+      </a:schemeClr>
+    </cs:fontRef>
+    <cs:defRPr sz="900" kern="1200"/>
+  </cs:valueAxis>
+  <cs:wall>
+    <cs:lnRef idx="0"/>
+    <cs:fillRef idx="0"/>
+    <cs:effectRef idx="0"/>
+    <cs:fontRef idx="minor">
+      <a:schemeClr val="tx1"/>
+    </cs:fontRef>
+    <cs:spPr>
+      <a:noFill/>
+      <a:ln>
+        <a:noFill/>
+      </a:ln>
+    </cs:spPr>
+  </cs:wall>
+</cs:chartStyle>
+</file>
+
+<file path=ppt/charts/style3.xml><?xml version="1.0" encoding="utf-8"?>
+<cs:chartStyle xmlns:cs="http://schemas.microsoft.com/office/drawing/2012/chartStyle" xmlns:a="http://schemas.openxmlformats.org/drawingml/2006/main" id="201">
+  <cs:axisTitle>
+    <cs:lnRef idx="0"/>
+    <cs:fillRef idx="0"/>
+    <cs:effectRef idx="0"/>
+    <cs:fontRef idx="minor">
+      <a:schemeClr val="tx1">
+        <a:lumMod val="65000"/>
+        <a:lumOff val="35000"/>
+      </a:schemeClr>
+    </cs:fontRef>
+    <cs:defRPr sz="1000" kern="1200"/>
+  </cs:axisTitle>
+  <cs:categoryAxis>
+    <cs:lnRef idx="0"/>
+    <cs:fillRef idx="0"/>
+    <cs:effectRef idx="0"/>
+    <cs:fontRef idx="minor">
+      <a:schemeClr val="tx1">
+        <a:lumMod val="65000"/>
+        <a:lumOff val="35000"/>
+      </a:schemeClr>
+    </cs:fontRef>
+    <cs:spPr>
+      <a:ln w="9525" cap="flat" cmpd="sng" algn="ctr">
+        <a:solidFill>
+          <a:schemeClr val="tx1">
+            <a:lumMod val="15000"/>
+            <a:lumOff val="85000"/>
+          </a:schemeClr>
+        </a:solidFill>
+        <a:round/>
+      </a:ln>
+    </cs:spPr>
+    <cs:defRPr sz="900" kern="1200"/>
+  </cs:categoryAxis>
+  <cs:chartArea mods="allowNoFillOverride allowNoLineOverride">
+    <cs:lnRef idx="0"/>
+    <cs:fillRef idx="0"/>
+    <cs:effectRef idx="0"/>
+    <cs:fontRef idx="minor">
+      <a:schemeClr val="tx1"/>
+    </cs:fontRef>
+    <cs:spPr>
+      <a:solidFill>
+        <a:schemeClr val="bg1"/>
+      </a:solidFill>
+      <a:ln w="9525" cap="flat" cmpd="sng" algn="ctr">
+        <a:solidFill>
+          <a:schemeClr val="tx1">
+            <a:lumMod val="15000"/>
+            <a:lumOff val="85000"/>
+          </a:schemeClr>
+        </a:solidFill>
+        <a:round/>
+      </a:ln>
+    </cs:spPr>
+    <cs:defRPr sz="1000" kern="1200"/>
+  </cs:chartArea>
+  <cs:dataLabel>
+    <cs:lnRef idx="0"/>
+    <cs:fillRef idx="0"/>
+    <cs:effectRef idx="0"/>
+    <cs:fontRef idx="minor">
+      <a:schemeClr val="tx1">
+        <a:lumMod val="75000"/>
+        <a:lumOff val="25000"/>
+      </a:schemeClr>
+    </cs:fontRef>
+    <cs:defRPr sz="900" kern="1200"/>
+  </cs:dataLabel>
+  <cs:dataLabelCallout>
+    <cs:lnRef idx="0"/>
+    <cs:fillRef idx="0"/>
+    <cs:effectRef idx="0"/>
+    <cs:fontRef idx="minor">
+      <a:schemeClr val="dk1">
+        <a:lumMod val="65000"/>
+        <a:lumOff val="35000"/>
+      </a:schemeClr>
+    </cs:fontRef>
+    <cs:spPr>
+      <a:solidFill>
+        <a:schemeClr val="lt1"/>
+      </a:solidFill>
+      <a:ln>
+        <a:solidFill>
+          <a:schemeClr val="dk1">
+            <a:lumMod val="25000"/>
+            <a:lumOff val="75000"/>
+          </a:schemeClr>
+        </a:solidFill>
+      </a:ln>
+    </cs:spPr>
+    <cs:defRPr sz="900" kern="1200"/>
+    <cs:bodyPr rot="0" spcFirstLastPara="1" vertOverflow="clip" horzOverflow="clip" vert="horz" wrap="square" lIns="36576" tIns="18288" rIns="36576" bIns="18288" anchor="ctr" anchorCtr="1">
+      <a:spAutoFit/>
+    </cs:bodyPr>
+  </cs:dataLabelCallout>
+  <cs:dataPoint>
+    <cs:lnRef idx="0"/>
+    <cs:fillRef idx="1">
+      <cs:styleClr val="auto"/>
+    </cs:fillRef>
+    <cs:effectRef idx="0"/>
+    <cs:fontRef idx="minor">
+      <a:schemeClr val="tx1"/>
+    </cs:fontRef>
+  </cs:dataPoint>
+  <cs:dataPoint3D>
+    <cs:lnRef idx="0"/>
+    <cs:fillRef idx="1">
+      <cs:styleClr val="auto"/>
+    </cs:fillRef>
+    <cs:effectRef idx="0"/>
+    <cs:fontRef idx="minor">
+      <a:schemeClr val="tx1"/>
+    </cs:fontRef>
+  </cs:dataPoint3D>
+  <cs:dataPointLine>
+    <cs:lnRef idx="0">
+      <cs:styleClr val="auto"/>
+    </cs:lnRef>
+    <cs:fillRef idx="1"/>
+    <cs:effectRef idx="0"/>
+    <cs:fontRef idx="minor">
+      <a:schemeClr val="tx1"/>
+    </cs:fontRef>
+    <cs:spPr>
+      <a:ln w="28575" cap="rnd">
+        <a:solidFill>
+          <a:schemeClr val="phClr"/>
+        </a:solidFill>
+        <a:round/>
+      </a:ln>
+    </cs:spPr>
+  </cs:dataPointLine>
+  <cs:dataPointMarker>
+    <cs:lnRef idx="0">
+      <cs:styleClr val="auto"/>
+    </cs:lnRef>
+    <cs:fillRef idx="1">
+      <cs:styleClr val="auto"/>
+    </cs:fillRef>
+    <cs:effectRef idx="0"/>
+    <cs:fontRef idx="minor">
+      <a:schemeClr val="tx1"/>
+    </cs:fontRef>
+    <cs:spPr>
+      <a:ln w="9525">
+        <a:solidFill>
+          <a:schemeClr val="phClr"/>
+        </a:solidFill>
+      </a:ln>
+    </cs:spPr>
+  </cs:dataPointMarker>
+  <cs:dataPointMarkerLayout symbol="circle" size="5"/>
+  <cs:dataPointWireframe>
+    <cs:lnRef idx="0">
+      <cs:styleClr val="auto"/>
+    </cs:lnRef>
+    <cs:fillRef idx="1"/>
+    <cs:effectRef idx="0"/>
+    <cs:fontRef idx="minor">
+      <a:schemeClr val="tx1"/>
+    </cs:fontRef>
+    <cs:spPr>
+      <a:ln w="9525" cap="rnd">
+        <a:solidFill>
+          <a:schemeClr val="phClr"/>
+        </a:solidFill>
+        <a:round/>
+      </a:ln>
+    </cs:spPr>
+  </cs:dataPointWireframe>
+  <cs:dataTable>
+    <cs:lnRef idx="0"/>
+    <cs:fillRef idx="0"/>
+    <cs:effectRef idx="0"/>
+    <cs:fontRef idx="minor">
+      <a:schemeClr val="tx1">
+        <a:lumMod val="65000"/>
+        <a:lumOff val="35000"/>
+      </a:schemeClr>
+    </cs:fontRef>
+    <cs:spPr>
+      <a:noFill/>
+      <a:ln w="9525" cap="flat" cmpd="sng" algn="ctr">
+        <a:solidFill>
+          <a:schemeClr val="tx1">
+            <a:lumMod val="15000"/>
+            <a:lumOff val="85000"/>
+          </a:schemeClr>
+        </a:solidFill>
+        <a:round/>
+      </a:ln>
+    </cs:spPr>
+    <cs:defRPr sz="900" kern="1200"/>
+  </cs:dataTable>
+  <cs:downBar>
+    <cs:lnRef idx="0"/>
+    <cs:fillRef idx="0"/>
+    <cs:effectRef idx="0"/>
+    <cs:fontRef idx="minor">
+      <a:schemeClr val="dk1"/>
+    </cs:fontRef>
+    <cs:spPr>
+      <a:solidFill>
+        <a:schemeClr val="dk1">
+          <a:lumMod val="65000"/>
+          <a:lumOff val="35000"/>
+        </a:schemeClr>
+      </a:solidFill>
+      <a:ln w="9525">
+        <a:solidFill>
+          <a:schemeClr val="tx1">
+            <a:lumMod val="65000"/>
+            <a:lumOff val="35000"/>
+          </a:schemeClr>
+        </a:solidFill>
+      </a:ln>
+    </cs:spPr>
+  </cs:downBar>
+  <cs:dropLine>
+    <cs:lnRef idx="0"/>
+    <cs:fillRef idx="0"/>
+    <cs:effectRef idx="0"/>
+    <cs:fontRef idx="minor">
+      <a:schemeClr val="tx1"/>
+    </cs:fontRef>
+    <cs:spPr>
+      <a:ln w="9525" cap="flat" cmpd="sng" algn="ctr">
+        <a:solidFill>
+          <a:schemeClr val="tx1">
+            <a:lumMod val="35000"/>
+            <a:lumOff val="65000"/>
+          </a:schemeClr>
+        </a:solidFill>
+        <a:round/>
+      </a:ln>
+    </cs:spPr>
+  </cs:dropLine>
+  <cs:errorBar>
+    <cs:lnRef idx="0"/>
+    <cs:fillRef idx="0"/>
+    <cs:effectRef idx="0"/>
+    <cs:fontRef idx="minor">
+      <a:schemeClr val="tx1"/>
+    </cs:fontRef>
+    <cs:spPr>
+      <a:ln w="9525" cap="flat" cmpd="sng" algn="ctr">
+        <a:solidFill>
+          <a:schemeClr val="tx1">
+            <a:lumMod val="65000"/>
+            <a:lumOff val="35000"/>
+          </a:schemeClr>
+        </a:solidFill>
+        <a:round/>
+      </a:ln>
+    </cs:spPr>
+  </cs:errorBar>
+  <cs:floor>
+    <cs:lnRef idx="0"/>
+    <cs:fillRef idx="0"/>
+    <cs:effectRef idx="0"/>
+    <cs:fontRef idx="minor">
+      <a:schemeClr val="tx1"/>
+    </cs:fontRef>
+    <cs:spPr>
+      <a:noFill/>
+      <a:ln>
+        <a:noFill/>
+      </a:ln>
+    </cs:spPr>
+  </cs:floor>
+  <cs:gridlineMajor>
+    <cs:lnRef idx="0"/>
+    <cs:fillRef idx="0"/>
+    <cs:effectRef idx="0"/>
+    <cs:fontRef idx="minor">
+      <a:schemeClr val="tx1"/>
+    </cs:fontRef>
+    <cs:spPr>
+      <a:ln w="9525" cap="flat" cmpd="sng" algn="ctr">
+        <a:solidFill>
+          <a:schemeClr val="tx1">
+            <a:lumMod val="15000"/>
+            <a:lumOff val="85000"/>
+          </a:schemeClr>
+        </a:solidFill>
+        <a:round/>
+      </a:ln>
+    </cs:spPr>
+  </cs:gridlineMajor>
+  <cs:gridlineMinor>
+    <cs:lnRef idx="0"/>
+    <cs:fillRef idx="0"/>
+    <cs:effectRef idx="0"/>
+    <cs:fontRef idx="minor">
+      <a:schemeClr val="tx1"/>
+    </cs:fontRef>
+    <cs:spPr>
+      <a:ln w="9525" cap="flat" cmpd="sng" algn="ctr">
+        <a:solidFill>
+          <a:schemeClr val="tx1">
+            <a:lumMod val="5000"/>
+            <a:lumOff val="95000"/>
+          </a:schemeClr>
+        </a:solidFill>
+        <a:round/>
+      </a:ln>
+    </cs:spPr>
+  </cs:gridlineMinor>
+  <cs:hiLoLine>
+    <cs:lnRef idx="0"/>
+    <cs:fillRef idx="0"/>
+    <cs:effectRef idx="0"/>
+    <cs:fontRef idx="minor">
+      <a:schemeClr val="tx1"/>
+    </cs:fontRef>
+    <cs:spPr>
+      <a:ln w="9525" cap="flat" cmpd="sng" algn="ctr">
+        <a:solidFill>
+          <a:schemeClr val="tx1">
+            <a:lumMod val="75000"/>
+            <a:lumOff val="25000"/>
+          </a:schemeClr>
+        </a:solidFill>
+        <a:round/>
+      </a:ln>
+    </cs:spPr>
+  </cs:hiLoLine>
+  <cs:leaderLine>
+    <cs:lnRef idx="0"/>
+    <cs:fillRef idx="0"/>
+    <cs:effectRef idx="0"/>
+    <cs:fontRef idx="minor">
+      <a:schemeClr val="tx1"/>
+    </cs:fontRef>
+    <cs:spPr>
+      <a:ln w="9525" cap="flat" cmpd="sng" algn="ctr">
+        <a:solidFill>
+          <a:schemeClr val="tx1">
+            <a:lumMod val="35000"/>
+            <a:lumOff val="65000"/>
+          </a:schemeClr>
+        </a:solidFill>
+        <a:round/>
+      </a:ln>
+    </cs:spPr>
+  </cs:leaderLine>
+  <cs:legend>
+    <cs:lnRef idx="0"/>
+    <cs:fillRef idx="0"/>
+    <cs:effectRef idx="0"/>
+    <cs:fontRef idx="minor">
+      <a:schemeClr val="tx1">
+        <a:lumMod val="65000"/>
+        <a:lumOff val="35000"/>
+      </a:schemeClr>
+    </cs:fontRef>
+    <cs:defRPr sz="900" kern="1200"/>
+  </cs:legend>
+  <cs:plotArea mods="allowNoFillOverride allowNoLineOverride">
+    <cs:lnRef idx="0"/>
+    <cs:fillRef idx="0"/>
+    <cs:effectRef idx="0"/>
+    <cs:fontRef idx="minor">
+      <a:schemeClr val="tx1"/>
+    </cs:fontRef>
+  </cs:plotArea>
+  <cs:plotArea3D mods="allowNoFillOverride allowNoLineOverride">
+    <cs:lnRef idx="0"/>
+    <cs:fillRef idx="0"/>
+    <cs:effectRef idx="0"/>
+    <cs:fontRef idx="minor">
+      <a:schemeClr val="tx1"/>
+    </cs:fontRef>
+  </cs:plotArea3D>
+  <cs:seriesAxis>
+    <cs:lnRef idx="0"/>
+    <cs:fillRef idx="0"/>
+    <cs:effectRef idx="0"/>
+    <cs:fontRef idx="minor">
+      <a:schemeClr val="tx1">
+        <a:lumMod val="65000"/>
+        <a:lumOff val="35000"/>
+      </a:schemeClr>
+    </cs:fontRef>
+    <cs:defRPr sz="900" kern="1200"/>
+  </cs:seriesAxis>
+  <cs:seriesLine>
+    <cs:lnRef idx="0"/>
+    <cs:fillRef idx="0"/>
+    <cs:effectRef idx="0"/>
+    <cs:fontRef idx="minor">
+      <a:schemeClr val="tx1"/>
+    </cs:fontRef>
+    <cs:spPr>
+      <a:ln w="9525" cap="flat" cmpd="sng" algn="ctr">
+        <a:solidFill>
+          <a:schemeClr val="tx1">
+            <a:lumMod val="35000"/>
+            <a:lumOff val="65000"/>
+          </a:schemeClr>
+        </a:solidFill>
+        <a:round/>
+      </a:ln>
+    </cs:spPr>
+  </cs:seriesLine>
+  <cs:title>
+    <cs:lnRef idx="0"/>
+    <cs:fillRef idx="0"/>
+    <cs:effectRef idx="0"/>
+    <cs:fontRef idx="minor">
+      <a:schemeClr val="tx1">
+        <a:lumMod val="65000"/>
+        <a:lumOff val="35000"/>
+      </a:schemeClr>
+    </cs:fontRef>
+    <cs:defRPr sz="1400" b="0" kern="1200" spc="0" baseline="0"/>
+  </cs:title>
+  <cs:trendline>
+    <cs:lnRef idx="0">
+      <cs:styleClr val="auto"/>
+    </cs:lnRef>
+    <cs:fillRef idx="0"/>
+    <cs:effectRef idx="0"/>
+    <cs:fontRef idx="minor">
+      <a:schemeClr val="tx1"/>
+    </cs:fontRef>
+    <cs:spPr>
+      <a:ln w="19050" cap="rnd">
+        <a:solidFill>
+          <a:schemeClr val="phClr"/>
+        </a:solidFill>
+        <a:prstDash val="sysDot"/>
+      </a:ln>
+    </cs:spPr>
+  </cs:trendline>
+  <cs:trendlineLabel>
+    <cs:lnRef idx="0"/>
+    <cs:fillRef idx="0"/>
+    <cs:effectRef idx="0"/>
+    <cs:fontRef idx="minor">
+      <a:schemeClr val="tx1">
+        <a:lumMod val="65000"/>
+        <a:lumOff val="35000"/>
+      </a:schemeClr>
+    </cs:fontRef>
+    <cs:defRPr sz="900" kern="1200"/>
+  </cs:trendlineLabel>
+  <cs:upBar>
+    <cs:lnRef idx="0"/>
+    <cs:fillRef idx="0"/>
+    <cs:effectRef idx="0"/>
+    <cs:fontRef idx="minor">
+      <a:schemeClr val="dk1"/>
+    </cs:fontRef>
+    <cs:spPr>
+      <a:solidFill>
+        <a:schemeClr val="lt1"/>
+      </a:solidFill>
+      <a:ln w="9525">
+        <a:solidFill>
+          <a:schemeClr val="tx1">
+            <a:lumMod val="15000"/>
+            <a:lumOff val="85000"/>
+          </a:schemeClr>
+        </a:solidFill>
+      </a:ln>
+    </cs:spPr>
+  </cs:upBar>
+  <cs:valueAxis>
+    <cs:lnRef idx="0"/>
+    <cs:fillRef idx="0"/>
+    <cs:effectRef idx="0"/>
+    <cs:fontRef idx="minor">
+      <a:schemeClr val="tx1">
+        <a:lumMod val="65000"/>
+        <a:lumOff val="35000"/>
+      </a:schemeClr>
+    </cs:fontRef>
+    <cs:defRPr sz="900" kern="1200"/>
+  </cs:valueAxis>
+  <cs:wall>
+    <cs:lnRef idx="0"/>
+    <cs:fillRef idx="0"/>
+    <cs:effectRef idx="0"/>
+    <cs:fontRef idx="minor">
+      <a:schemeClr val="tx1"/>
+    </cs:fontRef>
+    <cs:spPr>
+      <a:noFill/>
+      <a:ln>
+        <a:noFill/>
+      </a:ln>
+    </cs:spPr>
+  </cs:wall>
+</cs:chartStyle>
+</file>
+
 <file path=ppt/slideLayouts/slideLayout1.xml><?xml version="1.0" encoding="utf-8"?>
 <p:sldLayout xmlns:a="http://schemas.openxmlformats.org/drawingml/2006/main" xmlns:r="http://schemas.openxmlformats.org/officeDocument/2006/relationships" xmlns:p="http://schemas.openxmlformats.org/presentationml/2006/main" type="title" preserve="1">
   <p:cSld name="Slide de Título">
@@ -363,7 +2692,7 @@
             <a:fld id="{B61BEF0D-F0BB-DE4B-95CE-6DB70DBA9567}" type="datetimeFigureOut">
               <a:rPr lang="en-US" dirty="0"/>
               <a:pPr/>
-              <a:t>11/24/2018</a:t>
+              <a:t>12/4/2018</a:t>
             </a:fld>
             <a:endParaRPr lang="en-US" dirty="0"/>
           </a:p>
@@ -622,7 +2951,7 @@
             <a:fld id="{B61BEF0D-F0BB-DE4B-95CE-6DB70DBA9567}" type="datetimeFigureOut">
               <a:rPr lang="en-US" dirty="0"/>
               <a:pPr/>
-              <a:t>11/24/2018</a:t>
+              <a:t>12/4/2018</a:t>
             </a:fld>
             <a:endParaRPr lang="en-US" dirty="0"/>
           </a:p>
@@ -854,7 +3183,7 @@
             <a:fld id="{B61BEF0D-F0BB-DE4B-95CE-6DB70DBA9567}" type="datetimeFigureOut">
               <a:rPr lang="en-US" dirty="0"/>
               <a:pPr/>
-              <a:t>11/24/2018</a:t>
+              <a:t>12/4/2018</a:t>
             </a:fld>
             <a:endParaRPr lang="en-US" dirty="0"/>
           </a:p>
@@ -1091,7 +3420,7 @@
             <a:fld id="{B61BEF0D-F0BB-DE4B-95CE-6DB70DBA9567}" type="datetimeFigureOut">
               <a:rPr lang="en-US" dirty="0"/>
               <a:pPr/>
-              <a:t>11/24/2018</a:t>
+              <a:t>12/4/2018</a:t>
             </a:fld>
             <a:endParaRPr lang="en-US" dirty="0"/>
           </a:p>
@@ -1395,7 +3724,7 @@
             <a:fld id="{B61BEF0D-F0BB-DE4B-95CE-6DB70DBA9567}" type="datetimeFigureOut">
               <a:rPr lang="en-US" dirty="0"/>
               <a:pPr/>
-              <a:t>11/24/2018</a:t>
+              <a:t>12/4/2018</a:t>
             </a:fld>
             <a:endParaRPr lang="en-US" dirty="0"/>
           </a:p>
@@ -1694,7 +4023,7 @@
             <a:fld id="{B61BEF0D-F0BB-DE4B-95CE-6DB70DBA9567}" type="datetimeFigureOut">
               <a:rPr lang="en-US" dirty="0"/>
               <a:pPr/>
-              <a:t>11/24/2018</a:t>
+              <a:t>12/4/2018</a:t>
             </a:fld>
             <a:endParaRPr lang="en-US" dirty="0"/>
           </a:p>
@@ -2113,7 +4442,7 @@
             <a:fld id="{B61BEF0D-F0BB-DE4B-95CE-6DB70DBA9567}" type="datetimeFigureOut">
               <a:rPr lang="en-US" dirty="0"/>
               <a:pPr/>
-              <a:t>11/24/2018</a:t>
+              <a:t>12/4/2018</a:t>
             </a:fld>
             <a:endParaRPr lang="en-US" dirty="0"/>
           </a:p>
@@ -2272,7 +4601,7 @@
             <a:fld id="{B61BEF0D-F0BB-DE4B-95CE-6DB70DBA9567}" type="datetimeFigureOut">
               <a:rPr lang="en-US" dirty="0"/>
               <a:pPr/>
-              <a:t>11/24/2018</a:t>
+              <a:t>12/4/2018</a:t>
             </a:fld>
             <a:endParaRPr lang="en-US" dirty="0"/>
           </a:p>
@@ -2364,7 +4693,7 @@
             <a:fld id="{B61BEF0D-F0BB-DE4B-95CE-6DB70DBA9567}" type="datetimeFigureOut">
               <a:rPr lang="en-US" dirty="0"/>
               <a:pPr/>
-              <a:t>11/24/2018</a:t>
+              <a:t>12/4/2018</a:t>
             </a:fld>
             <a:endParaRPr lang="en-US" dirty="0"/>
           </a:p>
@@ -2739,7 +5068,7 @@
             <a:fld id="{B61BEF0D-F0BB-DE4B-95CE-6DB70DBA9567}" type="datetimeFigureOut">
               <a:rPr lang="en-US" dirty="0"/>
               <a:pPr/>
-              <a:t>11/24/2018</a:t>
+              <a:t>12/4/2018</a:t>
             </a:fld>
             <a:endParaRPr lang="en-US" dirty="0"/>
           </a:p>
@@ -3025,7 +5354,7 @@
             <a:fld id="{B61BEF0D-F0BB-DE4B-95CE-6DB70DBA9567}" type="datetimeFigureOut">
               <a:rPr lang="en-US" dirty="0"/>
               <a:pPr/>
-              <a:t>11/24/2018</a:t>
+              <a:t>12/4/2018</a:t>
             </a:fld>
             <a:endParaRPr lang="en-US" dirty="0"/>
           </a:p>
@@ -3233,7 +5562,7 @@
             <a:fld id="{B61BEF0D-F0BB-DE4B-95CE-6DB70DBA9567}" type="datetimeFigureOut">
               <a:rPr lang="en-US" dirty="0"/>
               <a:pPr/>
-              <a:t>11/24/2018</a:t>
+              <a:t>12/4/2018</a:t>
             </a:fld>
             <a:endParaRPr lang="en-US" dirty="0"/>
           </a:p>
@@ -3832,18 +6161,18 @@
       </p:grpSpPr>
       <p:sp>
         <p:nvSpPr>
-          <p:cNvPr id="2" name="Título 1"/>
+          <p:cNvPr id="3" name="Espaço Reservado para Texto 2"/>
           <p:cNvSpPr>
             <a:spLocks noGrp="1"/>
           </p:cNvSpPr>
           <p:nvPr>
-            <p:ph type="title"/>
+            <p:ph type="body" idx="1"/>
           </p:nvPr>
         </p:nvSpPr>
         <p:spPr>
           <a:xfrm>
-            <a:off x="581190" y="1320214"/>
-            <a:ext cx="11029615" cy="1497507"/>
+            <a:off x="658464" y="4630529"/>
+            <a:ext cx="11029615" cy="600556"/>
           </a:xfrm>
         </p:spPr>
         <p:txBody>
@@ -3854,52 +6183,930 @@
           <a:p>
             <a:pPr algn="ctr"/>
             <a:r>
-              <a:rPr lang="pt-BR" sz="5400" dirty="0" smtClean="0"/>
-              <a:t>Pizza </a:t>
-            </a:r>
-            <a:r>
-              <a:rPr lang="pt-BR" sz="5400" dirty="0" err="1" smtClean="0"/>
-              <a:t>Baue</a:t>
-            </a:r>
-            <a:endParaRPr lang="pt-BR" sz="5400" dirty="0"/>
+              <a:rPr lang="pt-BR" sz="2800" dirty="0" smtClean="0"/>
+              <a:t>Monte sua </a:t>
+            </a:r>
+            <a:r>
+              <a:rPr lang="pt-BR" sz="2800" dirty="0" smtClean="0"/>
+              <a:t>pizza</a:t>
+            </a:r>
           </a:p>
         </p:txBody>
       </p:sp>
-      <p:sp>
-        <p:nvSpPr>
-          <p:cNvPr id="3" name="Espaço Reservado para Texto 2"/>
-          <p:cNvSpPr>
-            <a:spLocks noGrp="1"/>
-          </p:cNvSpPr>
-          <p:nvPr>
-            <p:ph type="body" idx="1"/>
-          </p:nvPr>
-        </p:nvSpPr>
-        <p:spPr>
-          <a:xfrm>
-            <a:off x="581190" y="3196092"/>
-            <a:ext cx="11029615" cy="600556"/>
-          </a:xfrm>
-        </p:spPr>
-        <p:txBody>
-          <a:bodyPr>
-            <a:normAutofit/>
-          </a:bodyPr>
-          <a:lstStyle/>
-          <a:p>
-            <a:pPr algn="ctr"/>
-            <a:r>
-              <a:rPr lang="pt-BR" sz="1600" dirty="0" smtClean="0"/>
-              <a:t>Monte sua pizza em nosso site</a:t>
-            </a:r>
-            <a:endParaRPr lang="pt-BR" sz="1600" dirty="0"/>
-          </a:p>
-        </p:txBody>
-      </p:sp>
+      <p:pic>
+        <p:nvPicPr>
+          <p:cNvPr id="7" name="Imagem 6"/>
+          <p:cNvPicPr>
+            <a:picLocks noChangeAspect="1"/>
+          </p:cNvPicPr>
+          <p:nvPr/>
+        </p:nvPicPr>
+        <p:blipFill>
+          <a:blip r:embed="rId2">
+            <a:extLst>
+              <a:ext uri="{28A0092B-C50C-407E-A947-70E740481C1C}">
+                <a14:useLocalDpi xmlns:a14="http://schemas.microsoft.com/office/drawing/2010/main" val="0"/>
+              </a:ext>
+            </a:extLst>
+          </a:blip>
+          <a:stretch>
+            <a:fillRect/>
+          </a:stretch>
+        </p:blipFill>
+        <p:spPr>
+          <a:xfrm>
+            <a:off x="4186795" y="1101056"/>
+            <a:ext cx="3608481" cy="3521229"/>
+          </a:xfrm>
+          <a:prstGeom prst="rect">
+            <a:avLst/>
+          </a:prstGeom>
+        </p:spPr>
+      </p:pic>
     </p:spTree>
     <p:extLst>
       <p:ext uri="{BB962C8B-B14F-4D97-AF65-F5344CB8AC3E}">
         <p14:creationId xmlns:p14="http://schemas.microsoft.com/office/powerpoint/2010/main" val="3469185944"/>
+      </p:ext>
+    </p:extLst>
+  </p:cSld>
+  <p:clrMapOvr>
+    <a:masterClrMapping/>
+  </p:clrMapOvr>
+  <p:timing>
+    <p:tnLst>
+      <p:par>
+        <p:cTn id="1" dur="indefinite" restart="never" nodeType="tmRoot"/>
+      </p:par>
+    </p:tnLst>
+  </p:timing>
+</p:sld>
+</file>
+
+<file path=ppt/slides/slide10.xml><?xml version="1.0" encoding="utf-8"?>
+<p:sld xmlns:a="http://schemas.openxmlformats.org/drawingml/2006/main" xmlns:r="http://schemas.openxmlformats.org/officeDocument/2006/relationships" xmlns:p="http://schemas.openxmlformats.org/presentationml/2006/main">
+  <p:cSld>
+    <p:spTree>
+      <p:nvGrpSpPr>
+        <p:cNvPr id="1" name=""/>
+        <p:cNvGrpSpPr/>
+        <p:nvPr/>
+      </p:nvGrpSpPr>
+      <p:grpSpPr>
+        <a:xfrm>
+          <a:off x="0" y="0"/>
+          <a:ext cx="0" cy="0"/>
+          <a:chOff x="0" y="0"/>
+          <a:chExt cx="0" cy="0"/>
+        </a:xfrm>
+      </p:grpSpPr>
+      <p:sp>
+        <p:nvSpPr>
+          <p:cNvPr id="6" name="CaixaDeTexto 5"/>
+          <p:cNvSpPr txBox="1"/>
+          <p:nvPr/>
+        </p:nvSpPr>
+        <p:spPr>
+          <a:xfrm>
+            <a:off x="704193" y="1488217"/>
+            <a:ext cx="4656083" cy="646331"/>
+          </a:xfrm>
+          <a:prstGeom prst="rect">
+            <a:avLst/>
+          </a:prstGeom>
+          <a:noFill/>
+        </p:spPr>
+        <p:txBody>
+          <a:bodyPr wrap="square" rtlCol="0">
+            <a:spAutoFit/>
+          </a:bodyPr>
+          <a:lstStyle/>
+          <a:p>
+            <a:r>
+              <a:rPr lang="pt-BR" sz="3600" cap="all" dirty="0" smtClean="0">
+                <a:solidFill>
+                  <a:schemeClr val="accent1"/>
+                </a:solidFill>
+                <a:latin typeface="+mj-lt"/>
+                <a:ea typeface="+mj-ea"/>
+                <a:cs typeface="+mj-cs"/>
+              </a:rPr>
+              <a:t>INDEX:</a:t>
+            </a:r>
+            <a:endParaRPr lang="pt-BR" dirty="0"/>
+          </a:p>
+        </p:txBody>
+      </p:sp>
+      <p:pic>
+        <p:nvPicPr>
+          <p:cNvPr id="2" name="Imagem 1"/>
+          <p:cNvPicPr>
+            <a:picLocks noChangeAspect="1"/>
+          </p:cNvPicPr>
+          <p:nvPr/>
+        </p:nvPicPr>
+        <p:blipFill rotWithShape="1">
+          <a:blip r:embed="rId2"/>
+          <a:srcRect l="44476" t="23375" r="27524" b="10762"/>
+          <a:stretch/>
+        </p:blipFill>
+        <p:spPr>
+          <a:xfrm>
+            <a:off x="2497403" y="566057"/>
+            <a:ext cx="3433506" cy="4542972"/>
+          </a:xfrm>
+          <a:prstGeom prst="rect">
+            <a:avLst/>
+          </a:prstGeom>
+        </p:spPr>
+      </p:pic>
+      <p:pic>
+        <p:nvPicPr>
+          <p:cNvPr id="3" name="Imagem 2"/>
+          <p:cNvPicPr>
+            <a:picLocks noChangeAspect="1"/>
+          </p:cNvPicPr>
+          <p:nvPr/>
+        </p:nvPicPr>
+        <p:blipFill rotWithShape="1">
+          <a:blip r:embed="rId3"/>
+          <a:srcRect l="44286" t="28455" r="27524" b="20582"/>
+          <a:stretch/>
+        </p:blipFill>
+        <p:spPr>
+          <a:xfrm>
+            <a:off x="6252572" y="566057"/>
+            <a:ext cx="4296229" cy="4368801"/>
+          </a:xfrm>
+          <a:prstGeom prst="rect">
+            <a:avLst/>
+          </a:prstGeom>
+        </p:spPr>
+      </p:pic>
+      <p:pic>
+        <p:nvPicPr>
+          <p:cNvPr id="5" name="Imagem 4"/>
+          <p:cNvPicPr>
+            <a:picLocks noChangeAspect="1"/>
+          </p:cNvPicPr>
+          <p:nvPr/>
+        </p:nvPicPr>
+        <p:blipFill>
+          <a:blip r:embed="rId4">
+            <a:lum bright="70000" contrast="-70000"/>
+            <a:extLst>
+              <a:ext uri="{28A0092B-C50C-407E-A947-70E740481C1C}">
+                <a14:useLocalDpi xmlns:a14="http://schemas.microsoft.com/office/drawing/2010/main" val="0"/>
+              </a:ext>
+            </a:extLst>
+          </a:blip>
+          <a:stretch>
+            <a:fillRect/>
+          </a:stretch>
+        </p:blipFill>
+        <p:spPr>
+          <a:xfrm>
+            <a:off x="10856762" y="637041"/>
+            <a:ext cx="1005856" cy="981535"/>
+          </a:xfrm>
+          <a:prstGeom prst="rect">
+            <a:avLst/>
+          </a:prstGeom>
+        </p:spPr>
+      </p:pic>
+    </p:spTree>
+    <p:extLst>
+      <p:ext uri="{BB962C8B-B14F-4D97-AF65-F5344CB8AC3E}">
+        <p14:creationId xmlns:p14="http://schemas.microsoft.com/office/powerpoint/2010/main" val="3013805339"/>
+      </p:ext>
+    </p:extLst>
+  </p:cSld>
+  <p:clrMapOvr>
+    <a:masterClrMapping/>
+  </p:clrMapOvr>
+  <p:timing>
+    <p:tnLst>
+      <p:par>
+        <p:cTn id="1" dur="indefinite" restart="never" nodeType="tmRoot"/>
+      </p:par>
+    </p:tnLst>
+  </p:timing>
+</p:sld>
+</file>
+
+<file path=ppt/slides/slide11.xml><?xml version="1.0" encoding="utf-8"?>
+<p:sld xmlns:a="http://schemas.openxmlformats.org/drawingml/2006/main" xmlns:r="http://schemas.openxmlformats.org/officeDocument/2006/relationships" xmlns:p="http://schemas.openxmlformats.org/presentationml/2006/main">
+  <p:cSld>
+    <p:spTree>
+      <p:nvGrpSpPr>
+        <p:cNvPr id="1" name=""/>
+        <p:cNvGrpSpPr/>
+        <p:nvPr/>
+      </p:nvGrpSpPr>
+      <p:grpSpPr>
+        <a:xfrm>
+          <a:off x="0" y="0"/>
+          <a:ext cx="0" cy="0"/>
+          <a:chOff x="0" y="0"/>
+          <a:chExt cx="0" cy="0"/>
+        </a:xfrm>
+      </p:grpSpPr>
+      <p:sp>
+        <p:nvSpPr>
+          <p:cNvPr id="2" name="Título 1"/>
+          <p:cNvSpPr>
+            <a:spLocks noGrp="1"/>
+          </p:cNvSpPr>
+          <p:nvPr>
+            <p:ph type="title"/>
+          </p:nvPr>
+        </p:nvSpPr>
+        <p:spPr>
+          <a:xfrm>
+            <a:off x="581192" y="637041"/>
+            <a:ext cx="11029615" cy="1497507"/>
+          </a:xfrm>
+        </p:spPr>
+        <p:txBody>
+          <a:bodyPr/>
+          <a:lstStyle/>
+          <a:p>
+            <a:r>
+              <a:rPr lang="pt-BR" dirty="0" smtClean="0"/>
+              <a:t>	</a:t>
+            </a:r>
+            <a:endParaRPr lang="pt-BR" dirty="0"/>
+          </a:p>
+        </p:txBody>
+      </p:sp>
+      <p:pic>
+        <p:nvPicPr>
+          <p:cNvPr id="7" name="Imagem 6"/>
+          <p:cNvPicPr>
+            <a:picLocks noChangeAspect="1"/>
+          </p:cNvPicPr>
+          <p:nvPr/>
+        </p:nvPicPr>
+        <p:blipFill>
+          <a:blip r:embed="rId2">
+            <a:lum bright="70000" contrast="-70000"/>
+            <a:extLst>
+              <a:ext uri="{28A0092B-C50C-407E-A947-70E740481C1C}">
+                <a14:useLocalDpi xmlns:a14="http://schemas.microsoft.com/office/drawing/2010/main" val="0"/>
+              </a:ext>
+            </a:extLst>
+          </a:blip>
+          <a:stretch>
+            <a:fillRect/>
+          </a:stretch>
+        </p:blipFill>
+        <p:spPr>
+          <a:xfrm>
+            <a:off x="10856762" y="637041"/>
+            <a:ext cx="1005856" cy="981535"/>
+          </a:xfrm>
+          <a:prstGeom prst="rect">
+            <a:avLst/>
+          </a:prstGeom>
+        </p:spPr>
+      </p:pic>
+      <p:pic>
+        <p:nvPicPr>
+          <p:cNvPr id="3" name="Imagem 2"/>
+          <p:cNvPicPr>
+            <a:picLocks noChangeAspect="1"/>
+          </p:cNvPicPr>
+          <p:nvPr/>
+        </p:nvPicPr>
+        <p:blipFill>
+          <a:blip r:embed="rId3">
+            <a:extLst>
+              <a:ext uri="{28A0092B-C50C-407E-A947-70E740481C1C}">
+                <a14:useLocalDpi xmlns:a14="http://schemas.microsoft.com/office/drawing/2010/main" val="0"/>
+              </a:ext>
+            </a:extLst>
+          </a:blip>
+          <a:stretch>
+            <a:fillRect/>
+          </a:stretch>
+        </p:blipFill>
+        <p:spPr>
+          <a:xfrm>
+            <a:off x="6128058" y="1774129"/>
+            <a:ext cx="5413492" cy="3097835"/>
+          </a:xfrm>
+          <a:prstGeom prst="rect">
+            <a:avLst/>
+          </a:prstGeom>
+        </p:spPr>
+      </p:pic>
+      <p:pic>
+        <p:nvPicPr>
+          <p:cNvPr id="4" name="Imagem 3"/>
+          <p:cNvPicPr>
+            <a:picLocks noChangeAspect="1"/>
+          </p:cNvPicPr>
+          <p:nvPr/>
+        </p:nvPicPr>
+        <p:blipFill>
+          <a:blip r:embed="rId4">
+            <a:extLst>
+              <a:ext uri="{28A0092B-C50C-407E-A947-70E740481C1C}">
+                <a14:useLocalDpi xmlns:a14="http://schemas.microsoft.com/office/drawing/2010/main" val="0"/>
+              </a:ext>
+            </a:extLst>
+          </a:blip>
+          <a:stretch>
+            <a:fillRect/>
+          </a:stretch>
+        </p:blipFill>
+        <p:spPr>
+          <a:xfrm>
+            <a:off x="581192" y="1765720"/>
+            <a:ext cx="5546866" cy="3106245"/>
+          </a:xfrm>
+          <a:prstGeom prst="rect">
+            <a:avLst/>
+          </a:prstGeom>
+        </p:spPr>
+      </p:pic>
+      <p:sp>
+        <p:nvSpPr>
+          <p:cNvPr id="8" name="Título 1"/>
+          <p:cNvSpPr txBox="1">
+            <a:spLocks/>
+          </p:cNvSpPr>
+          <p:nvPr/>
+        </p:nvSpPr>
+        <p:spPr>
+          <a:xfrm>
+            <a:off x="581192" y="637041"/>
+            <a:ext cx="11029615" cy="571649"/>
+          </a:xfrm>
+          <a:prstGeom prst="rect">
+            <a:avLst/>
+          </a:prstGeom>
+        </p:spPr>
+        <p:txBody>
+          <a:bodyPr vert="horz" lIns="91440" tIns="45720" rIns="91440" bIns="45720" rtlCol="0" anchor="b">
+            <a:normAutofit fontScale="90000" lnSpcReduction="10000"/>
+          </a:bodyPr>
+          <a:lstStyle>
+            <a:lvl1pPr algn="l" defTabSz="457200" rtl="0" eaLnBrk="1" latinLnBrk="0" hangingPunct="1">
+              <a:spcBef>
+                <a:spcPct val="0"/>
+              </a:spcBef>
+              <a:buNone/>
+              <a:defRPr sz="3600" b="0" kern="1200" cap="all">
+                <a:solidFill>
+                  <a:schemeClr val="accent1"/>
+                </a:solidFill>
+                <a:latin typeface="+mj-lt"/>
+                <a:ea typeface="+mj-ea"/>
+                <a:cs typeface="+mj-cs"/>
+              </a:defRPr>
+            </a:lvl1pPr>
+            <a:lvl2pPr eaLnBrk="1" hangingPunct="1">
+              <a:defRPr>
+                <a:solidFill>
+                  <a:schemeClr val="tx2"/>
+                </a:solidFill>
+              </a:defRPr>
+            </a:lvl2pPr>
+            <a:lvl3pPr eaLnBrk="1" hangingPunct="1">
+              <a:defRPr>
+                <a:solidFill>
+                  <a:schemeClr val="tx2"/>
+                </a:solidFill>
+              </a:defRPr>
+            </a:lvl3pPr>
+            <a:lvl4pPr eaLnBrk="1" hangingPunct="1">
+              <a:defRPr>
+                <a:solidFill>
+                  <a:schemeClr val="tx2"/>
+                </a:solidFill>
+              </a:defRPr>
+            </a:lvl4pPr>
+            <a:lvl5pPr eaLnBrk="1" hangingPunct="1">
+              <a:defRPr>
+                <a:solidFill>
+                  <a:schemeClr val="tx2"/>
+                </a:solidFill>
+              </a:defRPr>
+            </a:lvl5pPr>
+            <a:lvl6pPr eaLnBrk="1" hangingPunct="1">
+              <a:defRPr>
+                <a:solidFill>
+                  <a:schemeClr val="tx2"/>
+                </a:solidFill>
+              </a:defRPr>
+            </a:lvl6pPr>
+            <a:lvl7pPr eaLnBrk="1" hangingPunct="1">
+              <a:defRPr>
+                <a:solidFill>
+                  <a:schemeClr val="tx2"/>
+                </a:solidFill>
+              </a:defRPr>
+            </a:lvl7pPr>
+            <a:lvl8pPr eaLnBrk="1" hangingPunct="1">
+              <a:defRPr>
+                <a:solidFill>
+                  <a:schemeClr val="tx2"/>
+                </a:solidFill>
+              </a:defRPr>
+            </a:lvl8pPr>
+            <a:lvl9pPr eaLnBrk="1" hangingPunct="1">
+              <a:defRPr>
+                <a:solidFill>
+                  <a:schemeClr val="tx2"/>
+                </a:solidFill>
+              </a:defRPr>
+            </a:lvl9pPr>
+          </a:lstStyle>
+          <a:p>
+            <a:r>
+              <a:rPr lang="pt-BR" dirty="0" smtClean="0"/>
+              <a:t>Cartão de visita</a:t>
+            </a:r>
+            <a:endParaRPr lang="pt-BR" dirty="0"/>
+          </a:p>
+        </p:txBody>
+      </p:sp>
+    </p:spTree>
+    <p:extLst>
+      <p:ext uri="{BB962C8B-B14F-4D97-AF65-F5344CB8AC3E}">
+        <p14:creationId xmlns:p14="http://schemas.microsoft.com/office/powerpoint/2010/main" val="644074382"/>
+      </p:ext>
+    </p:extLst>
+  </p:cSld>
+  <p:clrMapOvr>
+    <a:masterClrMapping/>
+  </p:clrMapOvr>
+  <p:timing>
+    <p:tnLst>
+      <p:par>
+        <p:cTn id="1" dur="indefinite" restart="never" nodeType="tmRoot"/>
+      </p:par>
+    </p:tnLst>
+  </p:timing>
+</p:sld>
+</file>
+
+<file path=ppt/slides/slide12.xml><?xml version="1.0" encoding="utf-8"?>
+<p:sld xmlns:a="http://schemas.openxmlformats.org/drawingml/2006/main" xmlns:r="http://schemas.openxmlformats.org/officeDocument/2006/relationships" xmlns:p="http://schemas.openxmlformats.org/presentationml/2006/main">
+  <p:cSld>
+    <p:spTree>
+      <p:nvGrpSpPr>
+        <p:cNvPr id="1" name=""/>
+        <p:cNvGrpSpPr/>
+        <p:nvPr/>
+      </p:nvGrpSpPr>
+      <p:grpSpPr>
+        <a:xfrm>
+          <a:off x="0" y="0"/>
+          <a:ext cx="0" cy="0"/>
+          <a:chOff x="0" y="0"/>
+          <a:chExt cx="0" cy="0"/>
+        </a:xfrm>
+      </p:grpSpPr>
+      <p:sp>
+        <p:nvSpPr>
+          <p:cNvPr id="2" name="Título 1"/>
+          <p:cNvSpPr>
+            <a:spLocks noGrp="1"/>
+          </p:cNvSpPr>
+          <p:nvPr>
+            <p:ph type="title"/>
+          </p:nvPr>
+        </p:nvSpPr>
+        <p:spPr>
+          <a:xfrm>
+            <a:off x="581192" y="637041"/>
+            <a:ext cx="11029615" cy="1497507"/>
+          </a:xfrm>
+        </p:spPr>
+        <p:txBody>
+          <a:bodyPr/>
+          <a:lstStyle/>
+          <a:p>
+            <a:r>
+              <a:rPr lang="pt-BR" dirty="0" smtClean="0"/>
+              <a:t>	</a:t>
+            </a:r>
+            <a:endParaRPr lang="pt-BR" dirty="0"/>
+          </a:p>
+        </p:txBody>
+      </p:sp>
+      <p:pic>
+        <p:nvPicPr>
+          <p:cNvPr id="7" name="Imagem 6"/>
+          <p:cNvPicPr>
+            <a:picLocks noChangeAspect="1"/>
+          </p:cNvPicPr>
+          <p:nvPr/>
+        </p:nvPicPr>
+        <p:blipFill>
+          <a:blip r:embed="rId2">
+            <a:lum bright="70000" contrast="-70000"/>
+            <a:extLst>
+              <a:ext uri="{28A0092B-C50C-407E-A947-70E740481C1C}">
+                <a14:useLocalDpi xmlns:a14="http://schemas.microsoft.com/office/drawing/2010/main" val="0"/>
+              </a:ext>
+            </a:extLst>
+          </a:blip>
+          <a:stretch>
+            <a:fillRect/>
+          </a:stretch>
+        </p:blipFill>
+        <p:spPr>
+          <a:xfrm>
+            <a:off x="10856762" y="637041"/>
+            <a:ext cx="1005856" cy="981535"/>
+          </a:xfrm>
+          <a:prstGeom prst="rect">
+            <a:avLst/>
+          </a:prstGeom>
+        </p:spPr>
+      </p:pic>
+      <p:sp>
+        <p:nvSpPr>
+          <p:cNvPr id="8" name="Título 1"/>
+          <p:cNvSpPr txBox="1">
+            <a:spLocks/>
+          </p:cNvSpPr>
+          <p:nvPr/>
+        </p:nvSpPr>
+        <p:spPr>
+          <a:xfrm>
+            <a:off x="581192" y="637041"/>
+            <a:ext cx="11029615" cy="571649"/>
+          </a:xfrm>
+          <a:prstGeom prst="rect">
+            <a:avLst/>
+          </a:prstGeom>
+        </p:spPr>
+        <p:txBody>
+          <a:bodyPr vert="horz" lIns="91440" tIns="45720" rIns="91440" bIns="45720" rtlCol="0" anchor="b">
+            <a:normAutofit fontScale="90000" lnSpcReduction="10000"/>
+          </a:bodyPr>
+          <a:lstStyle>
+            <a:lvl1pPr algn="l" defTabSz="457200" rtl="0" eaLnBrk="1" latinLnBrk="0" hangingPunct="1">
+              <a:spcBef>
+                <a:spcPct val="0"/>
+              </a:spcBef>
+              <a:buNone/>
+              <a:defRPr sz="3600" b="0" kern="1200" cap="all">
+                <a:solidFill>
+                  <a:schemeClr val="accent1"/>
+                </a:solidFill>
+                <a:latin typeface="+mj-lt"/>
+                <a:ea typeface="+mj-ea"/>
+                <a:cs typeface="+mj-cs"/>
+              </a:defRPr>
+            </a:lvl1pPr>
+            <a:lvl2pPr eaLnBrk="1" hangingPunct="1">
+              <a:defRPr>
+                <a:solidFill>
+                  <a:schemeClr val="tx2"/>
+                </a:solidFill>
+              </a:defRPr>
+            </a:lvl2pPr>
+            <a:lvl3pPr eaLnBrk="1" hangingPunct="1">
+              <a:defRPr>
+                <a:solidFill>
+                  <a:schemeClr val="tx2"/>
+                </a:solidFill>
+              </a:defRPr>
+            </a:lvl3pPr>
+            <a:lvl4pPr eaLnBrk="1" hangingPunct="1">
+              <a:defRPr>
+                <a:solidFill>
+                  <a:schemeClr val="tx2"/>
+                </a:solidFill>
+              </a:defRPr>
+            </a:lvl4pPr>
+            <a:lvl5pPr eaLnBrk="1" hangingPunct="1">
+              <a:defRPr>
+                <a:solidFill>
+                  <a:schemeClr val="tx2"/>
+                </a:solidFill>
+              </a:defRPr>
+            </a:lvl5pPr>
+            <a:lvl6pPr eaLnBrk="1" hangingPunct="1">
+              <a:defRPr>
+                <a:solidFill>
+                  <a:schemeClr val="tx2"/>
+                </a:solidFill>
+              </a:defRPr>
+            </a:lvl6pPr>
+            <a:lvl7pPr eaLnBrk="1" hangingPunct="1">
+              <a:defRPr>
+                <a:solidFill>
+                  <a:schemeClr val="tx2"/>
+                </a:solidFill>
+              </a:defRPr>
+            </a:lvl7pPr>
+            <a:lvl8pPr eaLnBrk="1" hangingPunct="1">
+              <a:defRPr>
+                <a:solidFill>
+                  <a:schemeClr val="tx2"/>
+                </a:solidFill>
+              </a:defRPr>
+            </a:lvl8pPr>
+            <a:lvl9pPr eaLnBrk="1" hangingPunct="1">
+              <a:defRPr>
+                <a:solidFill>
+                  <a:schemeClr val="tx2"/>
+                </a:solidFill>
+              </a:defRPr>
+            </a:lvl9pPr>
+          </a:lstStyle>
+          <a:p>
+            <a:r>
+              <a:rPr lang="pt-BR" dirty="0" smtClean="0"/>
+              <a:t>REDES</a:t>
+            </a:r>
+            <a:endParaRPr lang="pt-BR" dirty="0"/>
+          </a:p>
+        </p:txBody>
+      </p:sp>
+    </p:spTree>
+    <p:extLst>
+      <p:ext uri="{BB962C8B-B14F-4D97-AF65-F5344CB8AC3E}">
+        <p14:creationId xmlns:p14="http://schemas.microsoft.com/office/powerpoint/2010/main" val="2624791482"/>
+      </p:ext>
+    </p:extLst>
+  </p:cSld>
+  <p:clrMapOvr>
+    <a:masterClrMapping/>
+  </p:clrMapOvr>
+  <p:timing>
+    <p:tnLst>
+      <p:par>
+        <p:cTn id="1" dur="indefinite" restart="never" nodeType="tmRoot"/>
+      </p:par>
+    </p:tnLst>
+  </p:timing>
+</p:sld>
+</file>
+
+<file path=ppt/slides/slide13.xml><?xml version="1.0" encoding="utf-8"?>
+<p:sld xmlns:a="http://schemas.openxmlformats.org/drawingml/2006/main" xmlns:r="http://schemas.openxmlformats.org/officeDocument/2006/relationships" xmlns:p="http://schemas.openxmlformats.org/presentationml/2006/main">
+  <p:cSld>
+    <p:spTree>
+      <p:nvGrpSpPr>
+        <p:cNvPr id="1" name=""/>
+        <p:cNvGrpSpPr/>
+        <p:nvPr/>
+      </p:nvGrpSpPr>
+      <p:grpSpPr>
+        <a:xfrm>
+          <a:off x="0" y="0"/>
+          <a:ext cx="0" cy="0"/>
+          <a:chOff x="0" y="0"/>
+          <a:chExt cx="0" cy="0"/>
+        </a:xfrm>
+      </p:grpSpPr>
+      <p:sp>
+        <p:nvSpPr>
+          <p:cNvPr id="2" name="Título 1"/>
+          <p:cNvSpPr>
+            <a:spLocks noGrp="1"/>
+          </p:cNvSpPr>
+          <p:nvPr>
+            <p:ph type="title"/>
+          </p:nvPr>
+        </p:nvSpPr>
+        <p:spPr>
+          <a:xfrm>
+            <a:off x="581192" y="637041"/>
+            <a:ext cx="11029615" cy="1497507"/>
+          </a:xfrm>
+        </p:spPr>
+        <p:txBody>
+          <a:bodyPr/>
+          <a:lstStyle/>
+          <a:p>
+            <a:r>
+              <a:rPr lang="pt-BR" dirty="0" smtClean="0"/>
+              <a:t>	</a:t>
+            </a:r>
+            <a:endParaRPr lang="pt-BR" dirty="0"/>
+          </a:p>
+        </p:txBody>
+      </p:sp>
+      <p:pic>
+        <p:nvPicPr>
+          <p:cNvPr id="7" name="Imagem 6"/>
+          <p:cNvPicPr>
+            <a:picLocks noChangeAspect="1"/>
+          </p:cNvPicPr>
+          <p:nvPr/>
+        </p:nvPicPr>
+        <p:blipFill>
+          <a:blip r:embed="rId2">
+            <a:lum bright="70000" contrast="-70000"/>
+            <a:extLst>
+              <a:ext uri="{28A0092B-C50C-407E-A947-70E740481C1C}">
+                <a14:useLocalDpi xmlns:a14="http://schemas.microsoft.com/office/drawing/2010/main" val="0"/>
+              </a:ext>
+            </a:extLst>
+          </a:blip>
+          <a:stretch>
+            <a:fillRect/>
+          </a:stretch>
+        </p:blipFill>
+        <p:spPr>
+          <a:xfrm>
+            <a:off x="10856762" y="637041"/>
+            <a:ext cx="1005856" cy="981535"/>
+          </a:xfrm>
+          <a:prstGeom prst="rect">
+            <a:avLst/>
+          </a:prstGeom>
+        </p:spPr>
+      </p:pic>
+      <p:sp>
+        <p:nvSpPr>
+          <p:cNvPr id="8" name="Título 1"/>
+          <p:cNvSpPr txBox="1">
+            <a:spLocks/>
+          </p:cNvSpPr>
+          <p:nvPr/>
+        </p:nvSpPr>
+        <p:spPr>
+          <a:xfrm>
+            <a:off x="581192" y="637041"/>
+            <a:ext cx="11029615" cy="571649"/>
+          </a:xfrm>
+          <a:prstGeom prst="rect">
+            <a:avLst/>
+          </a:prstGeom>
+        </p:spPr>
+        <p:txBody>
+          <a:bodyPr vert="horz" lIns="91440" tIns="45720" rIns="91440" bIns="45720" rtlCol="0" anchor="b">
+            <a:normAutofit fontScale="90000" lnSpcReduction="10000"/>
+          </a:bodyPr>
+          <a:lstStyle>
+            <a:lvl1pPr algn="l" defTabSz="457200" rtl="0" eaLnBrk="1" latinLnBrk="0" hangingPunct="1">
+              <a:spcBef>
+                <a:spcPct val="0"/>
+              </a:spcBef>
+              <a:buNone/>
+              <a:defRPr sz="3600" b="0" kern="1200" cap="all">
+                <a:solidFill>
+                  <a:schemeClr val="accent1"/>
+                </a:solidFill>
+                <a:latin typeface="+mj-lt"/>
+                <a:ea typeface="+mj-ea"/>
+                <a:cs typeface="+mj-cs"/>
+              </a:defRPr>
+            </a:lvl1pPr>
+            <a:lvl2pPr eaLnBrk="1" hangingPunct="1">
+              <a:defRPr>
+                <a:solidFill>
+                  <a:schemeClr val="tx2"/>
+                </a:solidFill>
+              </a:defRPr>
+            </a:lvl2pPr>
+            <a:lvl3pPr eaLnBrk="1" hangingPunct="1">
+              <a:defRPr>
+                <a:solidFill>
+                  <a:schemeClr val="tx2"/>
+                </a:solidFill>
+              </a:defRPr>
+            </a:lvl3pPr>
+            <a:lvl4pPr eaLnBrk="1" hangingPunct="1">
+              <a:defRPr>
+                <a:solidFill>
+                  <a:schemeClr val="tx2"/>
+                </a:solidFill>
+              </a:defRPr>
+            </a:lvl4pPr>
+            <a:lvl5pPr eaLnBrk="1" hangingPunct="1">
+              <a:defRPr>
+                <a:solidFill>
+                  <a:schemeClr val="tx2"/>
+                </a:solidFill>
+              </a:defRPr>
+            </a:lvl5pPr>
+            <a:lvl6pPr eaLnBrk="1" hangingPunct="1">
+              <a:defRPr>
+                <a:solidFill>
+                  <a:schemeClr val="tx2"/>
+                </a:solidFill>
+              </a:defRPr>
+            </a:lvl6pPr>
+            <a:lvl7pPr eaLnBrk="1" hangingPunct="1">
+              <a:defRPr>
+                <a:solidFill>
+                  <a:schemeClr val="tx2"/>
+                </a:solidFill>
+              </a:defRPr>
+            </a:lvl7pPr>
+            <a:lvl8pPr eaLnBrk="1" hangingPunct="1">
+              <a:defRPr>
+                <a:solidFill>
+                  <a:schemeClr val="tx2"/>
+                </a:solidFill>
+              </a:defRPr>
+            </a:lvl8pPr>
+            <a:lvl9pPr eaLnBrk="1" hangingPunct="1">
+              <a:defRPr>
+                <a:solidFill>
+                  <a:schemeClr val="tx2"/>
+                </a:solidFill>
+              </a:defRPr>
+            </a:lvl9pPr>
+          </a:lstStyle>
+          <a:p>
+            <a:r>
+              <a:rPr lang="pt-BR" dirty="0" smtClean="0"/>
+              <a:t>HOSPEDAGEM</a:t>
+            </a:r>
+            <a:endParaRPr lang="pt-BR" dirty="0"/>
+          </a:p>
+        </p:txBody>
+      </p:sp>
+      <p:pic>
+        <p:nvPicPr>
+          <p:cNvPr id="3" name="Imagem 2"/>
+          <p:cNvPicPr>
+            <a:picLocks noChangeAspect="1"/>
+          </p:cNvPicPr>
+          <p:nvPr/>
+        </p:nvPicPr>
+        <p:blipFill>
+          <a:blip r:embed="rId3">
+            <a:extLst>
+              <a:ext uri="{28A0092B-C50C-407E-A947-70E740481C1C}">
+                <a14:useLocalDpi xmlns:a14="http://schemas.microsoft.com/office/drawing/2010/main" val="0"/>
+              </a:ext>
+            </a:extLst>
+          </a:blip>
+          <a:stretch>
+            <a:fillRect/>
+          </a:stretch>
+        </p:blipFill>
+        <p:spPr>
+          <a:xfrm>
+            <a:off x="3165419" y="1127808"/>
+            <a:ext cx="5545849" cy="3697233"/>
+          </a:xfrm>
+          <a:prstGeom prst="rect">
+            <a:avLst/>
+          </a:prstGeom>
+        </p:spPr>
+      </p:pic>
+      <p:sp>
+        <p:nvSpPr>
+          <p:cNvPr id="5" name="Retângulo 4"/>
+          <p:cNvSpPr/>
+          <p:nvPr/>
+        </p:nvSpPr>
+        <p:spPr>
+          <a:xfrm>
+            <a:off x="2728462" y="4240266"/>
+            <a:ext cx="6735072" cy="584775"/>
+          </a:xfrm>
+          <a:prstGeom prst="rect">
+            <a:avLst/>
+          </a:prstGeom>
+        </p:spPr>
+        <p:txBody>
+          <a:bodyPr wrap="square">
+            <a:spAutoFit/>
+          </a:bodyPr>
+          <a:lstStyle/>
+          <a:p>
+            <a:r>
+              <a:rPr lang="pt-BR" sz="3200" dirty="0" smtClean="0">
+                <a:solidFill>
+                  <a:srgbClr val="6647C8"/>
+                </a:solidFill>
+              </a:rPr>
+              <a:t>https</a:t>
+            </a:r>
+            <a:r>
+              <a:rPr lang="pt-BR" sz="3200" dirty="0">
+                <a:solidFill>
+                  <a:srgbClr val="6647C8"/>
+                </a:solidFill>
+              </a:rPr>
+              <a:t>://pizzabaue.000webhostapp.com/</a:t>
+            </a:r>
+            <a:endParaRPr lang="pt-BR" sz="3200" dirty="0">
+              <a:solidFill>
+                <a:srgbClr val="6647C8"/>
+              </a:solidFill>
+            </a:endParaRPr>
+          </a:p>
+        </p:txBody>
+      </p:sp>
+    </p:spTree>
+    <p:extLst>
+      <p:ext uri="{BB962C8B-B14F-4D97-AF65-F5344CB8AC3E}">
+        <p14:creationId xmlns:p14="http://schemas.microsoft.com/office/powerpoint/2010/main" val="3962788549"/>
       </p:ext>
     </p:extLst>
   </p:cSld>
@@ -3984,7 +7191,11 @@
           <a:lstStyle/>
           <a:p>
             <a:r>
-              <a:rPr lang="pt-BR" dirty="0" err="1" smtClean="0"/>
+              <a:rPr lang="pt-BR" dirty="0" err="1" smtClean="0">
+                <a:solidFill>
+                  <a:srgbClr val="FFC000"/>
+                </a:solidFill>
+              </a:rPr>
               <a:t>alISSON</a:t>
             </a:r>
             <a:r>
@@ -4021,6 +7232,37 @@
           </a:p>
         </p:txBody>
       </p:sp>
+      <p:pic>
+        <p:nvPicPr>
+          <p:cNvPr id="6" name="Imagem 5"/>
+          <p:cNvPicPr>
+            <a:picLocks noChangeAspect="1"/>
+          </p:cNvPicPr>
+          <p:nvPr/>
+        </p:nvPicPr>
+        <p:blipFill>
+          <a:blip r:embed="rId2">
+            <a:lum bright="70000" contrast="-70000"/>
+            <a:extLst>
+              <a:ext uri="{28A0092B-C50C-407E-A947-70E740481C1C}">
+                <a14:useLocalDpi xmlns:a14="http://schemas.microsoft.com/office/drawing/2010/main" val="0"/>
+              </a:ext>
+            </a:extLst>
+          </a:blip>
+          <a:stretch>
+            <a:fillRect/>
+          </a:stretch>
+        </p:blipFill>
+        <p:spPr>
+          <a:xfrm>
+            <a:off x="10856762" y="637041"/>
+            <a:ext cx="1005856" cy="981535"/>
+          </a:xfrm>
+          <a:prstGeom prst="rect">
+            <a:avLst/>
+          </a:prstGeom>
+        </p:spPr>
+      </p:pic>
     </p:spTree>
     <p:extLst>
       <p:ext uri="{BB962C8B-B14F-4D97-AF65-F5344CB8AC3E}">
@@ -4110,7 +7352,11 @@
           <a:p>
             <a:r>
               <a:rPr lang="pt-BR" dirty="0"/>
-              <a:t>Identificar as falhas no atendimento off-line para poder trazer o novo atendimento online no setor alimentício.</a:t>
+              <a:t>Identificar as falhas no atendimento off-line para poder trazer o novo atendimento online no setor alimentício</a:t>
+            </a:r>
+            <a:r>
+              <a:rPr lang="pt-BR" dirty="0" smtClean="0"/>
+              <a:t>.</a:t>
             </a:r>
           </a:p>
           <a:p>
@@ -4118,6 +7364,37 @@
           </a:p>
         </p:txBody>
       </p:sp>
+      <p:pic>
+        <p:nvPicPr>
+          <p:cNvPr id="6" name="Imagem 5"/>
+          <p:cNvPicPr>
+            <a:picLocks noChangeAspect="1"/>
+          </p:cNvPicPr>
+          <p:nvPr/>
+        </p:nvPicPr>
+        <p:blipFill>
+          <a:blip r:embed="rId2">
+            <a:lum bright="70000" contrast="-70000"/>
+            <a:extLst>
+              <a:ext uri="{28A0092B-C50C-407E-A947-70E740481C1C}">
+                <a14:useLocalDpi xmlns:a14="http://schemas.microsoft.com/office/drawing/2010/main" val="0"/>
+              </a:ext>
+            </a:extLst>
+          </a:blip>
+          <a:stretch>
+            <a:fillRect/>
+          </a:stretch>
+        </p:blipFill>
+        <p:spPr>
+          <a:xfrm>
+            <a:off x="10856762" y="637041"/>
+            <a:ext cx="1005856" cy="981535"/>
+          </a:xfrm>
+          <a:prstGeom prst="rect">
+            <a:avLst/>
+          </a:prstGeom>
+        </p:spPr>
+      </p:pic>
     </p:spTree>
     <p:extLst>
       <p:ext uri="{BB962C8B-B14F-4D97-AF65-F5344CB8AC3E}">
@@ -4141,6 +7418,11 @@
 <file path=ppt/slides/slide4.xml><?xml version="1.0" encoding="utf-8"?>
 <p:sld xmlns:a="http://schemas.openxmlformats.org/drawingml/2006/main" xmlns:r="http://schemas.openxmlformats.org/officeDocument/2006/relationships" xmlns:p="http://schemas.openxmlformats.org/presentationml/2006/main">
   <p:cSld>
+    <p:bg>
+      <p:bgRef idx="1001">
+        <a:schemeClr val="bg1"/>
+      </p:bgRef>
+    </p:bg>
     <p:spTree>
       <p:nvGrpSpPr>
         <p:cNvPr id="1" name=""/>
@@ -4157,51 +7439,75 @@
       </p:grpSpPr>
       <p:sp>
         <p:nvSpPr>
-          <p:cNvPr id="6" name="CaixaDeTexto 5"/>
-          <p:cNvSpPr txBox="1"/>
-          <p:nvPr/>
-        </p:nvSpPr>
-        <p:spPr>
-          <a:xfrm>
-            <a:off x="704193" y="1488217"/>
-            <a:ext cx="4656083" cy="646331"/>
-          </a:xfrm>
-          <a:prstGeom prst="rect">
-            <a:avLst/>
-          </a:prstGeom>
-          <a:noFill/>
+          <p:cNvPr id="2" name="Título 1"/>
+          <p:cNvSpPr>
+            <a:spLocks noGrp="1"/>
+          </p:cNvSpPr>
+          <p:nvPr>
+            <p:ph type="title"/>
+          </p:nvPr>
+        </p:nvSpPr>
+        <p:spPr>
+          <a:xfrm>
+            <a:off x="581192" y="637041"/>
+            <a:ext cx="11029615" cy="1497507"/>
+          </a:xfrm>
         </p:spPr>
         <p:txBody>
-          <a:bodyPr wrap="square" rtlCol="0">
-            <a:spAutoFit/>
+          <a:bodyPr>
+            <a:normAutofit fontScale="90000"/>
           </a:bodyPr>
           <a:lstStyle/>
           <a:p>
             <a:r>
-              <a:rPr lang="pt-BR" sz="3600" cap="all" dirty="0" smtClean="0">
-                <a:solidFill>
-                  <a:schemeClr val="accent1"/>
-                </a:solidFill>
-                <a:latin typeface="+mj-lt"/>
-                <a:ea typeface="+mj-ea"/>
-                <a:cs typeface="+mj-cs"/>
-              </a:rPr>
-              <a:t>INDEX:</a:t>
-            </a:r>
+              <a:rPr lang="pt-BR" dirty="0" err="1"/>
+              <a:t>Voce</a:t>
+            </a:r>
+            <a:r>
+              <a:rPr lang="pt-BR" dirty="0"/>
+              <a:t> gostaria de montar sua pizza do jeito </a:t>
+            </a:r>
+            <a:r>
+              <a:rPr lang="pt-BR" dirty="0" smtClean="0"/>
+              <a:t/>
+            </a:r>
+            <a:br>
+              <a:rPr lang="pt-BR" dirty="0" smtClean="0"/>
+            </a:br>
+            <a:r>
+              <a:rPr lang="pt-BR" dirty="0" smtClean="0"/>
+              <a:t>que  </a:t>
+            </a:r>
+            <a:r>
+              <a:rPr lang="pt-BR" dirty="0" err="1" smtClean="0"/>
+              <a:t>voce</a:t>
+            </a:r>
+            <a:r>
+              <a:rPr lang="pt-BR" dirty="0" smtClean="0"/>
+              <a:t> </a:t>
+            </a:r>
+            <a:r>
+              <a:rPr lang="pt-BR" dirty="0"/>
+              <a:t>quiser?</a:t>
+            </a:r>
+            <a:br>
+              <a:rPr lang="pt-BR" dirty="0"/>
+            </a:br>
             <a:endParaRPr lang="pt-BR" dirty="0"/>
           </a:p>
         </p:txBody>
       </p:sp>
       <p:pic>
         <p:nvPicPr>
-          <p:cNvPr id="7" name="Imagem 6"/>
+          <p:cNvPr id="6" name="Imagem 5"/>
           <p:cNvPicPr>
             <a:picLocks noChangeAspect="1"/>
           </p:cNvPicPr>
           <p:nvPr/>
         </p:nvPicPr>
         <p:blipFill>
-          <a:blip r:embed="rId2">
+          <a:blip r:embed="rId3">
+            <a:lum bright="70000" contrast="-70000"/>
             <a:extLst>
               <a:ext uri="{28A0092B-C50C-407E-A947-70E740481C1C}">
                 <a14:useLocalDpi xmlns:a14="http://schemas.microsoft.com/office/drawing/2010/main" val="0"/>
@@ -4214,23 +7520,47 @@
         </p:blipFill>
         <p:spPr>
           <a:xfrm>
-            <a:off x="4548376" y="637041"/>
-            <a:ext cx="3095245" cy="4458479"/>
+            <a:off x="10856762" y="637041"/>
+            <a:ext cx="1005856" cy="981535"/>
           </a:xfrm>
           <a:prstGeom prst="rect">
             <a:avLst/>
           </a:prstGeom>
         </p:spPr>
       </p:pic>
+      <p:graphicFrame>
+        <p:nvGraphicFramePr>
+          <p:cNvPr id="7" name="Gráfico 6"/>
+          <p:cNvGraphicFramePr>
+            <a:graphicFrameLocks/>
+          </p:cNvGraphicFramePr>
+          <p:nvPr>
+            <p:extLst>
+              <p:ext uri="{D42A27DB-BD31-4B8C-83A1-F6EECF244321}">
+                <p14:modId xmlns:p14="http://schemas.microsoft.com/office/powerpoint/2010/main" val="3272925880"/>
+              </p:ext>
+            </p:extLst>
+          </p:nvPr>
+        </p:nvGraphicFramePr>
+        <p:xfrm>
+          <a:off x="3321070" y="1761079"/>
+          <a:ext cx="5549857" cy="3363371"/>
+        </p:xfrm>
+        <a:graphic>
+          <a:graphicData uri="http://schemas.openxmlformats.org/drawingml/2006/chart">
+            <c:chart xmlns:c="http://schemas.openxmlformats.org/drawingml/2006/chart" xmlns:r="http://schemas.openxmlformats.org/officeDocument/2006/relationships" r:id="rId4"/>
+          </a:graphicData>
+        </a:graphic>
+      </p:graphicFrame>
     </p:spTree>
     <p:extLst>
       <p:ext uri="{BB962C8B-B14F-4D97-AF65-F5344CB8AC3E}">
-        <p14:creationId xmlns:p14="http://schemas.microsoft.com/office/powerpoint/2010/main" val="3768448025"/>
+        <p14:creationId xmlns:p14="http://schemas.microsoft.com/office/powerpoint/2010/main" val="3809704805"/>
       </p:ext>
     </p:extLst>
   </p:cSld>
   <p:clrMapOvr>
-    <a:masterClrMapping/>
+    <a:overrideClrMapping bg1="lt1" tx1="dk1" bg2="lt2" tx2="dk2" accent1="accent1" accent2="accent2" accent3="accent3" accent4="accent4" accent5="accent5" accent6="accent6" hlink="hlink" folHlink="folHlink"/>
   </p:clrMapOvr>
   <p:timing>
     <p:tnLst>
@@ -4259,83 +7589,104 @@
           <a:chExt cx="0" cy="0"/>
         </a:xfrm>
       </p:grpSpPr>
-      <p:sp>
-        <p:nvSpPr>
-          <p:cNvPr id="6" name="CaixaDeTexto 5"/>
-          <p:cNvSpPr txBox="1"/>
-          <p:nvPr/>
-        </p:nvSpPr>
-        <p:spPr>
-          <a:xfrm>
-            <a:off x="704193" y="1488217"/>
-            <a:ext cx="4656083" cy="646331"/>
-          </a:xfrm>
-          <a:prstGeom prst="rect">
-            <a:avLst/>
-          </a:prstGeom>
-          <a:noFill/>
+      <p:graphicFrame>
+        <p:nvGraphicFramePr>
+          <p:cNvPr id="9" name="Gráfico 8"/>
+          <p:cNvGraphicFramePr>
+            <a:graphicFrameLocks/>
+          </p:cNvGraphicFramePr>
+          <p:nvPr>
+            <p:extLst>
+              <p:ext uri="{D42A27DB-BD31-4B8C-83A1-F6EECF244321}">
+                <p14:modId xmlns:p14="http://schemas.microsoft.com/office/powerpoint/2010/main" val="2072873664"/>
+              </p:ext>
+            </p:extLst>
+          </p:nvPr>
+        </p:nvGraphicFramePr>
+        <p:xfrm>
+          <a:off x="3018843" y="1767166"/>
+          <a:ext cx="5956927" cy="3330614"/>
+        </p:xfrm>
+        <a:graphic>
+          <a:graphicData uri="http://schemas.openxmlformats.org/drawingml/2006/chart">
+            <c:chart xmlns:c="http://schemas.openxmlformats.org/drawingml/2006/chart" xmlns:r="http://schemas.openxmlformats.org/officeDocument/2006/relationships" r:id="rId2"/>
+          </a:graphicData>
+        </a:graphic>
+      </p:graphicFrame>
+      <p:sp>
+        <p:nvSpPr>
+          <p:cNvPr id="2" name="Título 1"/>
+          <p:cNvSpPr>
+            <a:spLocks noGrp="1"/>
+          </p:cNvSpPr>
+          <p:nvPr>
+            <p:ph type="title"/>
+          </p:nvPr>
+        </p:nvSpPr>
+        <p:spPr>
+          <a:xfrm>
+            <a:off x="581192" y="637041"/>
+            <a:ext cx="11029615" cy="1055125"/>
+          </a:xfrm>
         </p:spPr>
         <p:txBody>
-          <a:bodyPr wrap="square" rtlCol="0">
-            <a:spAutoFit/>
+          <a:bodyPr>
+            <a:normAutofit fontScale="90000"/>
           </a:bodyPr>
           <a:lstStyle/>
           <a:p>
             <a:r>
-              <a:rPr lang="pt-BR" sz="3600" cap="all" dirty="0" smtClean="0">
-                <a:solidFill>
-                  <a:schemeClr val="accent1"/>
-                </a:solidFill>
-                <a:latin typeface="+mj-lt"/>
-                <a:ea typeface="+mj-ea"/>
-                <a:cs typeface="+mj-cs"/>
-              </a:rPr>
-              <a:t>INDEX:</a:t>
-            </a:r>
+              <a:rPr lang="pt-BR" dirty="0" err="1"/>
+              <a:t>Voce</a:t>
+            </a:r>
+            <a:r>
+              <a:rPr lang="pt-BR" dirty="0"/>
+              <a:t> compraria uma pizza </a:t>
+            </a:r>
+            <a:r>
+              <a:rPr lang="pt-BR" dirty="0" err="1"/>
+              <a:t>atraves</a:t>
+            </a:r>
+            <a:r>
+              <a:rPr lang="pt-BR" dirty="0"/>
+              <a:t> de um site?</a:t>
+            </a:r>
+            <a:r>
+              <a:rPr lang="pt-BR" dirty="0"/>
+              <a:t/>
+            </a:r>
+            <a:br>
+              <a:rPr lang="pt-BR" dirty="0"/>
+            </a:br>
             <a:endParaRPr lang="pt-BR" dirty="0"/>
           </a:p>
         </p:txBody>
       </p:sp>
       <p:pic>
         <p:nvPicPr>
-          <p:cNvPr id="2" name="Imagem 1"/>
+          <p:cNvPr id="6" name="Imagem 5"/>
           <p:cNvPicPr>
             <a:picLocks noChangeAspect="1"/>
           </p:cNvPicPr>
           <p:nvPr/>
         </p:nvPicPr>
-        <p:blipFill rotWithShape="1">
-          <a:blip r:embed="rId2"/>
-          <a:srcRect l="44476" t="23375" r="27524" b="10762"/>
-          <a:stretch/>
+        <p:blipFill>
+          <a:blip r:embed="rId3">
+            <a:lum bright="70000" contrast="-70000"/>
+            <a:extLst>
+              <a:ext uri="{28A0092B-C50C-407E-A947-70E740481C1C}">
+                <a14:useLocalDpi xmlns:a14="http://schemas.microsoft.com/office/drawing/2010/main" val="0"/>
+              </a:ext>
+            </a:extLst>
+          </a:blip>
+          <a:stretch>
+            <a:fillRect/>
+          </a:stretch>
         </p:blipFill>
         <p:spPr>
           <a:xfrm>
-            <a:off x="3194633" y="566057"/>
-            <a:ext cx="3433506" cy="4542972"/>
-          </a:xfrm>
-          <a:prstGeom prst="rect">
-            <a:avLst/>
-          </a:prstGeom>
-        </p:spPr>
-      </p:pic>
-      <p:pic>
-        <p:nvPicPr>
-          <p:cNvPr id="3" name="Imagem 2"/>
-          <p:cNvPicPr>
-            <a:picLocks noChangeAspect="1"/>
-          </p:cNvPicPr>
-          <p:nvPr/>
-        </p:nvPicPr>
-        <p:blipFill rotWithShape="1">
-          <a:blip r:embed="rId3"/>
-          <a:srcRect l="44286" t="28455" r="27524" b="20582"/>
-          <a:stretch/>
-        </p:blipFill>
-        <p:spPr>
-          <a:xfrm>
-            <a:off x="7155542" y="566057"/>
-            <a:ext cx="4296229" cy="4368801"/>
+            <a:off x="10856762" y="637041"/>
+            <a:ext cx="1005856" cy="981535"/>
           </a:xfrm>
           <a:prstGeom prst="rect">
             <a:avLst/>
@@ -4345,7 +7696,7 @@
     </p:spTree>
     <p:extLst>
       <p:ext uri="{BB962C8B-B14F-4D97-AF65-F5344CB8AC3E}">
-        <p14:creationId xmlns:p14="http://schemas.microsoft.com/office/powerpoint/2010/main" val="3013805339"/>
+        <p14:creationId xmlns:p14="http://schemas.microsoft.com/office/powerpoint/2010/main" val="695334414"/>
       </p:ext>
     </p:extLst>
   </p:cSld>
@@ -4396,17 +7747,235 @@
           </a:xfrm>
         </p:spPr>
         <p:txBody>
-          <a:bodyPr/>
+          <a:bodyPr>
+            <a:normAutofit fontScale="90000"/>
+          </a:bodyPr>
           <a:lstStyle/>
           <a:p>
             <a:r>
+              <a:rPr lang="pt-BR" dirty="0" err="1"/>
+              <a:t>Voce</a:t>
+            </a:r>
+            <a:r>
+              <a:rPr lang="pt-BR" dirty="0"/>
+              <a:t> acha que essa ideia ajudaria </a:t>
+            </a:r>
+            <a:r>
               <a:rPr lang="pt-BR" dirty="0" smtClean="0"/>
-              <a:t>	</a:t>
-            </a:r>
+              <a:t>algum </a:t>
+            </a:r>
+            <a:br>
+              <a:rPr lang="pt-BR" dirty="0" smtClean="0"/>
+            </a:br>
+            <a:r>
+              <a:rPr lang="pt-BR" dirty="0" err="1" smtClean="0"/>
+              <a:t>proprietario</a:t>
+            </a:r>
+            <a:r>
+              <a:rPr lang="pt-BR" dirty="0" smtClean="0"/>
+              <a:t> de uma pizzaria?</a:t>
+            </a:r>
+            <a:r>
+              <a:rPr lang="pt-BR" dirty="0"/>
+              <a:t/>
+            </a:r>
+            <a:br>
+              <a:rPr lang="pt-BR" dirty="0"/>
+            </a:br>
             <a:endParaRPr lang="pt-BR" dirty="0"/>
           </a:p>
         </p:txBody>
       </p:sp>
+      <p:pic>
+        <p:nvPicPr>
+          <p:cNvPr id="6" name="Imagem 5"/>
+          <p:cNvPicPr>
+            <a:picLocks noChangeAspect="1"/>
+          </p:cNvPicPr>
+          <p:nvPr/>
+        </p:nvPicPr>
+        <p:blipFill>
+          <a:blip r:embed="rId2">
+            <a:lum bright="70000" contrast="-70000"/>
+            <a:extLst>
+              <a:ext uri="{28A0092B-C50C-407E-A947-70E740481C1C}">
+                <a14:useLocalDpi xmlns:a14="http://schemas.microsoft.com/office/drawing/2010/main" val="0"/>
+              </a:ext>
+            </a:extLst>
+          </a:blip>
+          <a:stretch>
+            <a:fillRect/>
+          </a:stretch>
+        </p:blipFill>
+        <p:spPr>
+          <a:xfrm>
+            <a:off x="10856762" y="637041"/>
+            <a:ext cx="1005856" cy="981535"/>
+          </a:xfrm>
+          <a:prstGeom prst="rect">
+            <a:avLst/>
+          </a:prstGeom>
+        </p:spPr>
+      </p:pic>
+      <p:graphicFrame>
+        <p:nvGraphicFramePr>
+          <p:cNvPr id="7" name="Gráfico 6"/>
+          <p:cNvGraphicFramePr>
+            <a:graphicFrameLocks/>
+          </p:cNvGraphicFramePr>
+          <p:nvPr>
+            <p:extLst>
+              <p:ext uri="{D42A27DB-BD31-4B8C-83A1-F6EECF244321}">
+                <p14:modId xmlns:p14="http://schemas.microsoft.com/office/powerpoint/2010/main" val="2004192926"/>
+              </p:ext>
+            </p:extLst>
+          </p:nvPr>
+        </p:nvGraphicFramePr>
+        <p:xfrm>
+          <a:off x="3357028" y="1692166"/>
+          <a:ext cx="5477942" cy="3279227"/>
+        </p:xfrm>
+        <a:graphic>
+          <a:graphicData uri="http://schemas.openxmlformats.org/drawingml/2006/chart">
+            <c:chart xmlns:c="http://schemas.openxmlformats.org/drawingml/2006/chart" xmlns:r="http://schemas.openxmlformats.org/officeDocument/2006/relationships" r:id="rId3"/>
+          </a:graphicData>
+        </a:graphic>
+      </p:graphicFrame>
+    </p:spTree>
+    <p:extLst>
+      <p:ext uri="{BB962C8B-B14F-4D97-AF65-F5344CB8AC3E}">
+        <p14:creationId xmlns:p14="http://schemas.microsoft.com/office/powerpoint/2010/main" val="352906309"/>
+      </p:ext>
+    </p:extLst>
+  </p:cSld>
+  <p:clrMapOvr>
+    <a:masterClrMapping/>
+  </p:clrMapOvr>
+  <p:timing>
+    <p:tnLst>
+      <p:par>
+        <p:cTn id="1" dur="indefinite" restart="never" nodeType="tmRoot"/>
+      </p:par>
+    </p:tnLst>
+  </p:timing>
+</p:sld>
+</file>
+
+<file path=ppt/slides/slide7.xml><?xml version="1.0" encoding="utf-8"?>
+<p:sld xmlns:a="http://schemas.openxmlformats.org/drawingml/2006/main" xmlns:r="http://schemas.openxmlformats.org/officeDocument/2006/relationships" xmlns:p="http://schemas.openxmlformats.org/presentationml/2006/main">
+  <p:cSld>
+    <p:spTree>
+      <p:nvGrpSpPr>
+        <p:cNvPr id="1" name=""/>
+        <p:cNvGrpSpPr/>
+        <p:nvPr/>
+      </p:nvGrpSpPr>
+      <p:grpSpPr>
+        <a:xfrm>
+          <a:off x="0" y="0"/>
+          <a:ext cx="0" cy="0"/>
+          <a:chOff x="0" y="0"/>
+          <a:chExt cx="0" cy="0"/>
+        </a:xfrm>
+      </p:grpSpPr>
+      <p:sp>
+        <p:nvSpPr>
+          <p:cNvPr id="2" name="Título 1"/>
+          <p:cNvSpPr>
+            <a:spLocks noGrp="1"/>
+          </p:cNvSpPr>
+          <p:nvPr>
+            <p:ph type="title"/>
+          </p:nvPr>
+        </p:nvSpPr>
+        <p:spPr>
+          <a:xfrm>
+            <a:off x="581192" y="637041"/>
+            <a:ext cx="11029615" cy="1497507"/>
+          </a:xfrm>
+        </p:spPr>
+        <p:txBody>
+          <a:bodyPr>
+            <a:normAutofit/>
+          </a:bodyPr>
+          <a:lstStyle/>
+          <a:p>
+            <a:r>
+              <a:rPr lang="pt-BR" dirty="0" smtClean="0"/>
+              <a:t>Pesquisa logo</a:t>
+            </a:r>
+            <a:endParaRPr lang="pt-BR" dirty="0"/>
+          </a:p>
+        </p:txBody>
+      </p:sp>
+      <p:pic>
+        <p:nvPicPr>
+          <p:cNvPr id="6" name="Imagem 5"/>
+          <p:cNvPicPr>
+            <a:picLocks noChangeAspect="1"/>
+          </p:cNvPicPr>
+          <p:nvPr/>
+        </p:nvPicPr>
+        <p:blipFill>
+          <a:blip r:embed="rId2">
+            <a:lum bright="70000" contrast="-70000"/>
+            <a:extLst>
+              <a:ext uri="{28A0092B-C50C-407E-A947-70E740481C1C}">
+                <a14:useLocalDpi xmlns:a14="http://schemas.microsoft.com/office/drawing/2010/main" val="0"/>
+              </a:ext>
+            </a:extLst>
+          </a:blip>
+          <a:stretch>
+            <a:fillRect/>
+          </a:stretch>
+        </p:blipFill>
+        <p:spPr>
+          <a:xfrm>
+            <a:off x="10856762" y="637041"/>
+            <a:ext cx="1005856" cy="981535"/>
+          </a:xfrm>
+          <a:prstGeom prst="rect">
+            <a:avLst/>
+          </a:prstGeom>
+        </p:spPr>
+      </p:pic>
+    </p:spTree>
+    <p:extLst>
+      <p:ext uri="{BB962C8B-B14F-4D97-AF65-F5344CB8AC3E}">
+        <p14:creationId xmlns:p14="http://schemas.microsoft.com/office/powerpoint/2010/main" val="3222136797"/>
+      </p:ext>
+    </p:extLst>
+  </p:cSld>
+  <p:clrMapOvr>
+    <a:masterClrMapping/>
+  </p:clrMapOvr>
+  <p:timing>
+    <p:tnLst>
+      <p:par>
+        <p:cTn id="1" dur="indefinite" restart="never" nodeType="tmRoot"/>
+      </p:par>
+    </p:tnLst>
+  </p:timing>
+</p:sld>
+</file>
+
+<file path=ppt/slides/slide8.xml><?xml version="1.0" encoding="utf-8"?>
+<p:sld xmlns:a="http://schemas.openxmlformats.org/drawingml/2006/main" xmlns:r="http://schemas.openxmlformats.org/officeDocument/2006/relationships" xmlns:p="http://schemas.openxmlformats.org/presentationml/2006/main">
+  <p:cSld>
+    <p:spTree>
+      <p:nvGrpSpPr>
+        <p:cNvPr id="1" name=""/>
+        <p:cNvGrpSpPr/>
+        <p:nvPr/>
+      </p:nvGrpSpPr>
+      <p:grpSpPr>
+        <a:xfrm>
+          <a:off x="0" y="0"/>
+          <a:ext cx="0" cy="0"/>
+          <a:chOff x="0" y="0"/>
+          <a:chExt cx="0" cy="0"/>
+        </a:xfrm>
+      </p:grpSpPr>
       <p:sp>
         <p:nvSpPr>
           <p:cNvPr id="6" name="CaixaDeTexto 5"/>
@@ -4438,108 +8007,209 @@
                 <a:ea typeface="+mj-ea"/>
                 <a:cs typeface="+mj-cs"/>
               </a:rPr>
-              <a:t>Próximos passos:</a:t>
+              <a:t>INDEX:</a:t>
             </a:r>
             <a:endParaRPr lang="pt-BR" dirty="0"/>
           </a:p>
         </p:txBody>
       </p:sp>
-      <p:sp>
-        <p:nvSpPr>
-          <p:cNvPr id="5" name="Espaço Reservado para Texto 2"/>
-          <p:cNvSpPr>
-            <a:spLocks noGrp="1"/>
-          </p:cNvSpPr>
-          <p:nvPr>
-            <p:ph type="body" idx="1"/>
-          </p:nvPr>
-        </p:nvSpPr>
-        <p:spPr>
-          <a:xfrm>
-            <a:off x="581192" y="2229140"/>
-            <a:ext cx="11029615" cy="2637149"/>
-          </a:xfrm>
-        </p:spPr>
-        <p:txBody>
-          <a:bodyPr>
-            <a:normAutofit/>
-          </a:bodyPr>
-          <a:lstStyle/>
-          <a:p>
-            <a:pPr marL="285750" indent="-285750">
-              <a:buFont typeface="Arial" panose="020B0604020202020204" pitchFamily="34" charset="0"/>
-              <a:buChar char="•"/>
-            </a:pPr>
-            <a:r>
-              <a:rPr lang="pt-BR" dirty="0" smtClean="0"/>
-              <a:t>Finalizar </a:t>
-            </a:r>
-            <a:r>
-              <a:rPr lang="pt-BR" dirty="0" smtClean="0"/>
-              <a:t>detalhes do site</a:t>
-            </a:r>
-            <a:endParaRPr lang="pt-BR" dirty="0" smtClean="0"/>
-          </a:p>
-          <a:p>
-            <a:pPr marL="285750" indent="-285750">
-              <a:buFont typeface="Arial" panose="020B0604020202020204" pitchFamily="34" charset="0"/>
-              <a:buChar char="•"/>
-            </a:pPr>
-            <a:r>
-              <a:rPr lang="pt-BR" dirty="0" smtClean="0"/>
-              <a:t>Finalizar </a:t>
-            </a:r>
-            <a:r>
-              <a:rPr lang="pt-BR" dirty="0" err="1" smtClean="0"/>
-              <a:t>php</a:t>
-            </a:r>
-            <a:r>
-              <a:rPr lang="pt-BR" dirty="0" smtClean="0"/>
-              <a:t> e banco de dados</a:t>
-            </a:r>
-            <a:endParaRPr lang="pt-BR" dirty="0" smtClean="0"/>
-          </a:p>
-          <a:p>
-            <a:pPr marL="285750" indent="-285750">
-              <a:buFont typeface="Arial" panose="020B0604020202020204" pitchFamily="34" charset="0"/>
-              <a:buChar char="•"/>
-            </a:pPr>
-            <a:r>
-              <a:rPr lang="pt-BR" dirty="0" smtClean="0"/>
-              <a:t>Finalizar documentação</a:t>
-            </a:r>
-          </a:p>
-          <a:p>
-            <a:pPr marL="285750" indent="-285750">
-              <a:buFont typeface="Arial" panose="020B0604020202020204" pitchFamily="34" charset="0"/>
-              <a:buChar char="•"/>
-            </a:pPr>
-            <a:r>
-              <a:rPr lang="pt-BR" dirty="0" smtClean="0"/>
-              <a:t>Planejar o workshop</a:t>
-            </a:r>
-            <a:endParaRPr lang="pt-BR" dirty="0" smtClean="0"/>
-          </a:p>
-          <a:p>
-            <a:pPr marL="285750" indent="-285750">
-              <a:buFont typeface="Arial" panose="020B0604020202020204" pitchFamily="34" charset="0"/>
-              <a:buChar char="•"/>
-            </a:pPr>
-            <a:endParaRPr lang="pt-BR" dirty="0" smtClean="0"/>
-          </a:p>
-          <a:p>
-            <a:pPr marL="285750" indent="-285750">
-              <a:buFont typeface="Arial" panose="020B0604020202020204" pitchFamily="34" charset="0"/>
-              <a:buChar char="•"/>
-            </a:pPr>
-            <a:endParaRPr lang="pt-BR" dirty="0"/>
-          </a:p>
-        </p:txBody>
-      </p:sp>
+      <p:pic>
+        <p:nvPicPr>
+          <p:cNvPr id="7" name="Imagem 6"/>
+          <p:cNvPicPr>
+            <a:picLocks noChangeAspect="1"/>
+          </p:cNvPicPr>
+          <p:nvPr/>
+        </p:nvPicPr>
+        <p:blipFill>
+          <a:blip r:embed="rId2">
+            <a:extLst>
+              <a:ext uri="{28A0092B-C50C-407E-A947-70E740481C1C}">
+                <a14:useLocalDpi xmlns:a14="http://schemas.microsoft.com/office/drawing/2010/main" val="0"/>
+              </a:ext>
+            </a:extLst>
+          </a:blip>
+          <a:stretch>
+            <a:fillRect/>
+          </a:stretch>
+        </p:blipFill>
+        <p:spPr>
+          <a:xfrm>
+            <a:off x="4548376" y="637041"/>
+            <a:ext cx="3095245" cy="4458479"/>
+          </a:xfrm>
+          <a:prstGeom prst="rect">
+            <a:avLst/>
+          </a:prstGeom>
+        </p:spPr>
+      </p:pic>
+      <p:pic>
+        <p:nvPicPr>
+          <p:cNvPr id="4" name="Imagem 3"/>
+          <p:cNvPicPr>
+            <a:picLocks noChangeAspect="1"/>
+          </p:cNvPicPr>
+          <p:nvPr/>
+        </p:nvPicPr>
+        <p:blipFill>
+          <a:blip r:embed="rId3">
+            <a:lum bright="70000" contrast="-70000"/>
+            <a:extLst>
+              <a:ext uri="{28A0092B-C50C-407E-A947-70E740481C1C}">
+                <a14:useLocalDpi xmlns:a14="http://schemas.microsoft.com/office/drawing/2010/main" val="0"/>
+              </a:ext>
+            </a:extLst>
+          </a:blip>
+          <a:stretch>
+            <a:fillRect/>
+          </a:stretch>
+        </p:blipFill>
+        <p:spPr>
+          <a:xfrm>
+            <a:off x="10856762" y="637041"/>
+            <a:ext cx="1005856" cy="981535"/>
+          </a:xfrm>
+          <a:prstGeom prst="rect">
+            <a:avLst/>
+          </a:prstGeom>
+        </p:spPr>
+      </p:pic>
     </p:spTree>
     <p:extLst>
       <p:ext uri="{BB962C8B-B14F-4D97-AF65-F5344CB8AC3E}">
-        <p14:creationId xmlns:p14="http://schemas.microsoft.com/office/powerpoint/2010/main" val="644074382"/>
+        <p14:creationId xmlns:p14="http://schemas.microsoft.com/office/powerpoint/2010/main" val="3768448025"/>
+      </p:ext>
+    </p:extLst>
+  </p:cSld>
+  <p:clrMapOvr>
+    <a:masterClrMapping/>
+  </p:clrMapOvr>
+  <p:timing>
+    <p:tnLst>
+      <p:par>
+        <p:cTn id="1" dur="indefinite" restart="never" nodeType="tmRoot"/>
+      </p:par>
+    </p:tnLst>
+  </p:timing>
+</p:sld>
+</file>
+
+<file path=ppt/slides/slide9.xml><?xml version="1.0" encoding="utf-8"?>
+<p:sld xmlns:a="http://schemas.openxmlformats.org/drawingml/2006/main" xmlns:r="http://schemas.openxmlformats.org/officeDocument/2006/relationships" xmlns:p="http://schemas.openxmlformats.org/presentationml/2006/main">
+  <p:cSld>
+    <p:spTree>
+      <p:nvGrpSpPr>
+        <p:cNvPr id="1" name=""/>
+        <p:cNvGrpSpPr/>
+        <p:nvPr/>
+      </p:nvGrpSpPr>
+      <p:grpSpPr>
+        <a:xfrm>
+          <a:off x="0" y="0"/>
+          <a:ext cx="0" cy="0"/>
+          <a:chOff x="0" y="0"/>
+          <a:chExt cx="0" cy="0"/>
+        </a:xfrm>
+      </p:grpSpPr>
+      <p:sp>
+        <p:nvSpPr>
+          <p:cNvPr id="2" name="Título 1"/>
+          <p:cNvSpPr>
+            <a:spLocks noGrp="1"/>
+          </p:cNvSpPr>
+          <p:nvPr>
+            <p:ph type="title"/>
+          </p:nvPr>
+        </p:nvSpPr>
+        <p:spPr>
+          <a:xfrm>
+            <a:off x="581192" y="637041"/>
+            <a:ext cx="11029615" cy="571649"/>
+          </a:xfrm>
+        </p:spPr>
+        <p:txBody>
+          <a:bodyPr>
+            <a:normAutofit fontScale="90000"/>
+          </a:bodyPr>
+          <a:lstStyle/>
+          <a:p>
+            <a:r>
+              <a:rPr lang="pt-BR" dirty="0" smtClean="0"/>
+              <a:t>Banco de dados</a:t>
+            </a:r>
+            <a:r>
+              <a:rPr lang="pt-BR" dirty="0" smtClean="0"/>
+              <a:t>	</a:t>
+            </a:r>
+            <a:endParaRPr lang="pt-BR" dirty="0"/>
+          </a:p>
+        </p:txBody>
+      </p:sp>
+      <p:pic>
+        <p:nvPicPr>
+          <p:cNvPr id="6" name="Imagem 5"/>
+          <p:cNvPicPr>
+            <a:picLocks noChangeAspect="1"/>
+          </p:cNvPicPr>
+          <p:nvPr/>
+        </p:nvPicPr>
+        <p:blipFill>
+          <a:blip r:embed="rId2">
+            <a:lum bright="70000" contrast="-70000"/>
+            <a:extLst>
+              <a:ext uri="{28A0092B-C50C-407E-A947-70E740481C1C}">
+                <a14:useLocalDpi xmlns:a14="http://schemas.microsoft.com/office/drawing/2010/main" val="0"/>
+              </a:ext>
+            </a:extLst>
+          </a:blip>
+          <a:stretch>
+            <a:fillRect/>
+          </a:stretch>
+        </p:blipFill>
+        <p:spPr>
+          <a:xfrm>
+            <a:off x="10856762" y="637041"/>
+            <a:ext cx="1005856" cy="981535"/>
+          </a:xfrm>
+          <a:prstGeom prst="rect">
+            <a:avLst/>
+          </a:prstGeom>
+        </p:spPr>
+      </p:pic>
+      <p:pic>
+        <p:nvPicPr>
+          <p:cNvPr id="4" name="Imagem 3"/>
+          <p:cNvPicPr>
+            <a:picLocks noChangeAspect="1"/>
+          </p:cNvPicPr>
+          <p:nvPr/>
+        </p:nvPicPr>
+        <p:blipFill>
+          <a:blip r:embed="rId3">
+            <a:extLst>
+              <a:ext uri="{28A0092B-C50C-407E-A947-70E740481C1C}">
+                <a14:useLocalDpi xmlns:a14="http://schemas.microsoft.com/office/drawing/2010/main" val="0"/>
+              </a:ext>
+            </a:extLst>
+          </a:blip>
+          <a:stretch>
+            <a:fillRect/>
+          </a:stretch>
+        </p:blipFill>
+        <p:spPr>
+          <a:xfrm>
+            <a:off x="3344998" y="1208690"/>
+            <a:ext cx="5502001" cy="3918426"/>
+          </a:xfrm>
+          <a:prstGeom prst="rect">
+            <a:avLst/>
+          </a:prstGeom>
+        </p:spPr>
+      </p:pic>
+    </p:spTree>
+    <p:extLst>
+      <p:ext uri="{BB962C8B-B14F-4D97-AF65-F5344CB8AC3E}">
+        <p14:creationId xmlns:p14="http://schemas.microsoft.com/office/powerpoint/2010/main" val="4123068965"/>
       </p:ext>
     </p:extLst>
   </p:cSld>
@@ -4823,4 +8493,47 @@
     </a:ext>
   </a:extLst>
 </a:theme>
+</file>
+
+<file path=ppt/theme/themeOverride1.xml><?xml version="1.0" encoding="utf-8"?>
+<a:themeOverride xmlns:a="http://schemas.openxmlformats.org/drawingml/2006/main">
+  <a:clrScheme name="Laranja Vermelho">
+    <a:dk1>
+      <a:sysClr val="windowText" lastClr="000000"/>
+    </a:dk1>
+    <a:lt1>
+      <a:sysClr val="window" lastClr="FFFFFF"/>
+    </a:lt1>
+    <a:dk2>
+      <a:srgbClr val="505046"/>
+    </a:dk2>
+    <a:lt2>
+      <a:srgbClr val="EEECE1"/>
+    </a:lt2>
+    <a:accent1>
+      <a:srgbClr val="E84C22"/>
+    </a:accent1>
+    <a:accent2>
+      <a:srgbClr val="FFBD47"/>
+    </a:accent2>
+    <a:accent3>
+      <a:srgbClr val="B64926"/>
+    </a:accent3>
+    <a:accent4>
+      <a:srgbClr val="FF8427"/>
+    </a:accent4>
+    <a:accent5>
+      <a:srgbClr val="CC9900"/>
+    </a:accent5>
+    <a:accent6>
+      <a:srgbClr val="B22600"/>
+    </a:accent6>
+    <a:hlink>
+      <a:srgbClr val="CC9900"/>
+    </a:hlink>
+    <a:folHlink>
+      <a:srgbClr val="666699"/>
+    </a:folHlink>
+  </a:clrScheme>
+</a:themeOverride>
 </file>
</xml_diff>